<commit_message>
report python almost done
</commit_message>
<xml_diff>
--- a/sem 7/Script PL/OOP Python.pptx
+++ b/sem 7/Script PL/OOP Python.pptx
@@ -3,22 +3,24 @@
 <p:presentation xmlns:a="http://schemas.openxmlformats.org/drawingml/2006/main" xmlns:p="http://schemas.openxmlformats.org/presentationml/2006/main" xmlns:r="http://schemas.openxmlformats.org/officeDocument/2006/relationships" xmlns:p14="http://schemas.microsoft.com/office/powerpoint/2010/main" xmlns:p15="http://schemas.microsoft.com/office/powerpoint/2012/main" xmlns:mc="http://schemas.openxmlformats.org/markup-compatibility/2006">
   <p:sldMasterIdLst>
     <p:sldMasterId id="2147483648" r:id="rId2"/>
+    <p:sldMasterId id="2147483650" r:id="rId3"/>
   </p:sldMasterIdLst>
   <p:sldIdLst>
-    <p:sldId id="256" r:id="rId3"/>
-    <p:sldId id="257" r:id="rId4"/>
-    <p:sldId id="258" r:id="rId5"/>
-    <p:sldId id="259" r:id="rId6"/>
-    <p:sldId id="260" r:id="rId7"/>
-    <p:sldId id="261" r:id="rId8"/>
-    <p:sldId id="262" r:id="rId9"/>
-    <p:sldId id="263" r:id="rId10"/>
-    <p:sldId id="264" r:id="rId11"/>
-    <p:sldId id="265" r:id="rId12"/>
-    <p:sldId id="266" r:id="rId13"/>
-    <p:sldId id="267" r:id="rId14"/>
-    <p:sldId id="268" r:id="rId15"/>
-    <p:sldId id="269" r:id="rId16"/>
+    <p:sldId id="256" r:id="rId4"/>
+    <p:sldId id="257" r:id="rId5"/>
+    <p:sldId id="258" r:id="rId6"/>
+    <p:sldId id="259" r:id="rId7"/>
+    <p:sldId id="260" r:id="rId8"/>
+    <p:sldId id="261" r:id="rId9"/>
+    <p:sldId id="262" r:id="rId10"/>
+    <p:sldId id="263" r:id="rId11"/>
+    <p:sldId id="264" r:id="rId12"/>
+    <p:sldId id="265" r:id="rId13"/>
+    <p:sldId id="266" r:id="rId14"/>
+    <p:sldId id="267" r:id="rId15"/>
+    <p:sldId id="268" r:id="rId16"/>
+    <p:sldId id="269" r:id="rId17"/>
+    <p:sldId id="270" r:id="rId18"/>
   </p:sldIdLst>
   <p:sldSz cx="10080625" cy="5670550"/>
   <p:notesSz cx="7772400" cy="10058400"/>
@@ -55,7 +57,7 @@
         <p:spPr>
           <a:xfrm>
             <a:off x="504000" y="226080"/>
-            <a:ext cx="9071640" cy="946440"/>
+            <a:ext cx="9071280" cy="946080"/>
           </a:xfrm>
           <a:prstGeom prst="rect">
             <a:avLst/>
@@ -73,11 +75,10 @@
             <a:pPr indent="0" algn="ctr">
               <a:buNone/>
             </a:pPr>
-            <a:endParaRPr b="0" lang="en-US" sz="4400" strike="noStrike" u="none">
-              <a:solidFill>
-                <a:srgbClr val="000000"/>
-              </a:solidFill>
-              <a:uFillTx/>
+            <a:endParaRPr b="0" lang="en-US" sz="4400" spc="-1" strike="noStrike">
+              <a:solidFill>
+                <a:srgbClr val="000000"/>
+              </a:solidFill>
               <a:latin typeface="Arial"/>
             </a:endParaRPr>
           </a:p>
@@ -90,7 +91,7 @@
             <a:spLocks noGrp="1"/>
           </p:cNvSpPr>
           <p:nvPr>
-            <p:ph type="ftr" idx="2"/>
+            <p:ph type="ftr" idx="1"/>
           </p:nvPr>
         </p:nvSpPr>
         <p:spPr/>
@@ -110,14 +111,14 @@
             <a:spLocks noGrp="1"/>
           </p:cNvSpPr>
           <p:nvPr>
-            <p:ph type="sldNum" idx="3"/>
+            <p:ph type="sldNum" idx="2"/>
           </p:nvPr>
         </p:nvSpPr>
         <p:spPr/>
         <p:txBody>
           <a:bodyPr/>
           <a:p>
-            <a:fld id="{47B902A8-C44F-4639-B7D6-047FFC488962}" type="slidenum">
+            <a:fld id="{0E2FFAE3-D838-4CFC-9EF8-B67ECF7CDDC0}" type="slidenum">
               <a:t>&lt;#&gt;</a:t>
             </a:fld>
           </a:p>
@@ -130,7 +131,7 @@
             <a:spLocks noGrp="1"/>
           </p:cNvSpPr>
           <p:nvPr>
-            <p:ph type="dt" idx="1"/>
+            <p:ph type="dt" idx="3"/>
           </p:nvPr>
         </p:nvSpPr>
         <p:spPr/>
@@ -151,7 +152,7 @@
 
 <file path=ppt/slideLayouts/slideLayout2.xml><?xml version="1.0" encoding="utf-8"?>
 <p:sldLayout xmlns:a="http://schemas.openxmlformats.org/drawingml/2006/main" xmlns:p="http://schemas.openxmlformats.org/presentationml/2006/main" xmlns:r="http://schemas.openxmlformats.org/officeDocument/2006/relationships" xmlns:p14="http://schemas.microsoft.com/office/powerpoint/2010/main" xmlns:p15="http://schemas.microsoft.com/office/powerpoint/2012/main" xmlns:mc="http://schemas.openxmlformats.org/markup-compatibility/2006" type="title" preserve="1">
-  <p:cSld name="Default">
+  <p:cSld name="Default 1">
     <p:spTree>
       <p:nvGrpSpPr>
         <p:cNvPr id="1" name=""/>
@@ -168,7 +169,7 @@
       </p:grpSpPr>
       <p:sp>
         <p:nvSpPr>
-          <p:cNvPr id="6" name="PlaceHolder 1"/>
+          <p:cNvPr id="11" name="PlaceHolder 1"/>
           <p:cNvSpPr>
             <a:spLocks noGrp="1"/>
           </p:cNvSpPr>
@@ -179,7 +180,7 @@
         <p:spPr>
           <a:xfrm>
             <a:off x="504000" y="226080"/>
-            <a:ext cx="9071640" cy="946440"/>
+            <a:ext cx="9071280" cy="946080"/>
           </a:xfrm>
           <a:prstGeom prst="rect">
             <a:avLst/>
@@ -197,19 +198,18 @@
             <a:pPr indent="0" algn="ctr">
               <a:buNone/>
             </a:pPr>
-            <a:endParaRPr b="0" lang="en-US" sz="4400" strike="noStrike" u="none">
-              <a:solidFill>
-                <a:srgbClr val="000000"/>
-              </a:solidFill>
-              <a:uFillTx/>
-              <a:latin typeface="Arial"/>
-            </a:endParaRPr>
-          </a:p>
-        </p:txBody>
-      </p:sp>
-      <p:sp>
-        <p:nvSpPr>
-          <p:cNvPr id="7" name="PlaceHolder 2"/>
+            <a:endParaRPr b="0" lang="en-US" sz="4400" spc="-1" strike="noStrike">
+              <a:solidFill>
+                <a:srgbClr val="000000"/>
+              </a:solidFill>
+              <a:latin typeface="Arial"/>
+            </a:endParaRPr>
+          </a:p>
+        </p:txBody>
+      </p:sp>
+      <p:sp>
+        <p:nvSpPr>
+          <p:cNvPr id="12" name="PlaceHolder 2"/>
           <p:cNvSpPr>
             <a:spLocks noGrp="1"/>
           </p:cNvSpPr>
@@ -220,7 +220,7 @@
         <p:spPr>
           <a:xfrm>
             <a:off x="504000" y="1326600"/>
-            <a:ext cx="9071640" cy="3288240"/>
+            <a:ext cx="9072000" cy="3288600"/>
           </a:xfrm>
           <a:prstGeom prst="rect">
             <a:avLst/>
@@ -238,11 +238,10 @@
             <a:pPr indent="0" algn="ctr">
               <a:buNone/>
             </a:pPr>
-            <a:endParaRPr b="0" lang="en-US" sz="3200" strike="noStrike" u="none">
-              <a:solidFill>
-                <a:srgbClr val="000000"/>
-              </a:solidFill>
-              <a:uFillTx/>
+            <a:endParaRPr b="0" lang="en-US" sz="3200" spc="-1" strike="noStrike">
+              <a:solidFill>
+                <a:srgbClr val="000000"/>
+              </a:solidFill>
               <a:latin typeface="Arial"/>
             </a:endParaRPr>
           </a:p>
@@ -255,7 +254,7 @@
             <a:spLocks noGrp="1"/>
           </p:cNvSpPr>
           <p:nvPr>
-            <p:ph type="ftr" idx="2"/>
+            <p:ph type="ftr" idx="4"/>
           </p:nvPr>
         </p:nvSpPr>
         <p:spPr/>
@@ -275,14 +274,14 @@
             <a:spLocks noGrp="1"/>
           </p:cNvSpPr>
           <p:nvPr>
-            <p:ph type="sldNum" idx="3"/>
+            <p:ph type="sldNum" idx="5"/>
           </p:nvPr>
         </p:nvSpPr>
         <p:spPr/>
         <p:txBody>
           <a:bodyPr/>
           <a:p>
-            <a:fld id="{BBFE091A-836A-43E7-B6A5-F7672C764379}" type="slidenum">
+            <a:fld id="{1D181625-2FFF-4B6C-953D-303E64AA01C0}" type="slidenum">
               <a:t>&lt;#&gt;</a:t>
             </a:fld>
           </a:p>
@@ -295,7 +294,7 @@
             <a:spLocks noGrp="1"/>
           </p:cNvSpPr>
           <p:nvPr>
-            <p:ph type="dt" idx="1"/>
+            <p:ph type="dt" idx="6"/>
           </p:nvPr>
         </p:nvSpPr>
         <p:spPr/>
@@ -344,7 +343,7 @@
         <p:spPr>
           <a:xfrm>
             <a:off x="504000" y="226080"/>
-            <a:ext cx="9071640" cy="946440"/>
+            <a:ext cx="9071280" cy="946080"/>
           </a:xfrm>
           <a:prstGeom prst="rect">
             <a:avLst/>
@@ -359,32 +358,234 @@
             <a:noAutofit/>
           </a:bodyPr>
           <a:p>
+            <a:pPr indent="0">
+              <a:buNone/>
+            </a:pPr>
+            <a:r>
+              <a:rPr b="0" lang="en-US" sz="1800" spc="-1" strike="noStrike">
+                <a:solidFill>
+                  <a:srgbClr val="000000"/>
+                </a:solidFill>
+                <a:latin typeface="Arial"/>
+              </a:rPr>
+              <a:t>Click to edit the title text format</a:t>
+            </a:r>
+            <a:endParaRPr b="0" lang="en-US" sz="1800" spc="-1" strike="noStrike">
+              <a:solidFill>
+                <a:srgbClr val="000000"/>
+              </a:solidFill>
+              <a:latin typeface="Arial"/>
+            </a:endParaRPr>
+          </a:p>
+        </p:txBody>
+      </p:sp>
+      <p:sp>
+        <p:nvSpPr>
+          <p:cNvPr id="1" name="PlaceHolder 2"/>
+          <p:cNvSpPr>
+            <a:spLocks noGrp="1"/>
+          </p:cNvSpPr>
+          <p:nvPr>
+            <p:ph type="ftr" idx="1"/>
+          </p:nvPr>
+        </p:nvSpPr>
+        <p:spPr>
+          <a:xfrm>
+            <a:off x="3447360" y="5165280"/>
+            <a:ext cx="3194640" cy="390240"/>
+          </a:xfrm>
+          <a:prstGeom prst="rect">
+            <a:avLst/>
+          </a:prstGeom>
+          <a:noFill/>
+          <a:ln w="0">
+            <a:noFill/>
+          </a:ln>
+        </p:spPr>
+        <p:txBody>
+          <a:bodyPr lIns="0" rIns="0" tIns="0" bIns="0" anchor="t">
+            <a:noAutofit/>
+          </a:bodyPr>
+          <a:lstStyle>
+            <a:lvl1pPr indent="0" algn="ctr">
+              <a:lnSpc>
+                <a:spcPct val="100000"/>
+              </a:lnSpc>
+              <a:buNone/>
+              <a:tabLst>
+                <a:tab algn="l" pos="0"/>
+              </a:tabLst>
+              <a:defRPr b="0" lang="en-US" sz="1400" spc="-1" strike="noStrike">
+                <a:solidFill>
+                  <a:srgbClr val="000000"/>
+                </a:solidFill>
+                <a:latin typeface="Times New Roman"/>
+              </a:defRPr>
+            </a:lvl1pPr>
+          </a:lstStyle>
+          <a:p>
             <a:pPr indent="0" algn="ctr">
+              <a:lnSpc>
+                <a:spcPct val="100000"/>
+              </a:lnSpc>
               <a:buNone/>
-            </a:pPr>
-            <a:r>
-              <a:rPr b="0" lang="en-US" sz="4400" strike="noStrike" u="none">
-                <a:solidFill>
-                  <a:srgbClr val="000000"/>
-                </a:solidFill>
-                <a:uFillTx/>
-                <a:latin typeface="Arial"/>
-              </a:rPr>
-              <a:t>Click to edit the title text format</a:t>
-            </a:r>
-            <a:endParaRPr b="0" lang="en-US" sz="4400" strike="noStrike" u="none">
-              <a:solidFill>
-                <a:srgbClr val="000000"/>
-              </a:solidFill>
-              <a:uFillTx/>
-              <a:latin typeface="Arial"/>
-            </a:endParaRPr>
-          </a:p>
-        </p:txBody>
-      </p:sp>
-      <p:sp>
-        <p:nvSpPr>
-          <p:cNvPr id="1" name="PlaceHolder 2"/>
+              <a:tabLst>
+                <a:tab algn="l" pos="0"/>
+              </a:tabLst>
+            </a:pPr>
+            <a:r>
+              <a:rPr b="0" lang="en-US" sz="1400" spc="-1" strike="noStrike">
+                <a:solidFill>
+                  <a:srgbClr val="000000"/>
+                </a:solidFill>
+                <a:latin typeface="Times New Roman"/>
+              </a:rPr>
+              <a:t>&lt;footer&gt;</a:t>
+            </a:r>
+            <a:endParaRPr b="0" lang="en-US" sz="1400" spc="-1" strike="noStrike">
+              <a:solidFill>
+                <a:srgbClr val="000000"/>
+              </a:solidFill>
+              <a:latin typeface="Times New Roman"/>
+            </a:endParaRPr>
+          </a:p>
+        </p:txBody>
+      </p:sp>
+      <p:sp>
+        <p:nvSpPr>
+          <p:cNvPr id="2" name="PlaceHolder 3"/>
+          <p:cNvSpPr>
+            <a:spLocks noGrp="1"/>
+          </p:cNvSpPr>
+          <p:nvPr>
+            <p:ph type="sldNum" idx="2"/>
+          </p:nvPr>
+        </p:nvSpPr>
+        <p:spPr>
+          <a:xfrm>
+            <a:off x="7227360" y="5165280"/>
+            <a:ext cx="2347920" cy="390240"/>
+          </a:xfrm>
+          <a:prstGeom prst="rect">
+            <a:avLst/>
+          </a:prstGeom>
+          <a:noFill/>
+          <a:ln w="0">
+            <a:noFill/>
+          </a:ln>
+        </p:spPr>
+        <p:txBody>
+          <a:bodyPr lIns="0" rIns="0" tIns="0" bIns="0" anchor="t">
+            <a:noAutofit/>
+          </a:bodyPr>
+          <a:lstStyle>
+            <a:lvl1pPr indent="0" algn="r">
+              <a:lnSpc>
+                <a:spcPct val="100000"/>
+              </a:lnSpc>
+              <a:buNone/>
+              <a:tabLst>
+                <a:tab algn="l" pos="0"/>
+              </a:tabLst>
+              <a:defRPr b="0" lang="en-US" sz="1400" spc="-1" strike="noStrike">
+                <a:solidFill>
+                  <a:srgbClr val="000000"/>
+                </a:solidFill>
+                <a:latin typeface="Times New Roman"/>
+              </a:defRPr>
+            </a:lvl1pPr>
+          </a:lstStyle>
+          <a:p>
+            <a:pPr indent="0" algn="r">
+              <a:lnSpc>
+                <a:spcPct val="100000"/>
+              </a:lnSpc>
+              <a:buNone/>
+              <a:tabLst>
+                <a:tab algn="l" pos="0"/>
+              </a:tabLst>
+            </a:pPr>
+            <a:fld id="{1900EFF3-F469-44EF-B306-E145D904BA16}" type="slidenum">
+              <a:rPr b="0" lang="en-US" sz="1400" spc="-1" strike="noStrike">
+                <a:solidFill>
+                  <a:srgbClr val="000000"/>
+                </a:solidFill>
+                <a:latin typeface="Times New Roman"/>
+              </a:rPr>
+              <a:t>&lt;number&gt;</a:t>
+            </a:fld>
+            <a:endParaRPr b="0" lang="en-US" sz="1400" spc="-1" strike="noStrike">
+              <a:solidFill>
+                <a:srgbClr val="000000"/>
+              </a:solidFill>
+              <a:latin typeface="Times New Roman"/>
+            </a:endParaRPr>
+          </a:p>
+        </p:txBody>
+      </p:sp>
+      <p:sp>
+        <p:nvSpPr>
+          <p:cNvPr id="3" name="PlaceHolder 4"/>
+          <p:cNvSpPr>
+            <a:spLocks noGrp="1"/>
+          </p:cNvSpPr>
+          <p:nvPr>
+            <p:ph type="dt" idx="3"/>
+          </p:nvPr>
+        </p:nvSpPr>
+        <p:spPr>
+          <a:xfrm>
+            <a:off x="504000" y="5165280"/>
+            <a:ext cx="2347920" cy="390240"/>
+          </a:xfrm>
+          <a:prstGeom prst="rect">
+            <a:avLst/>
+          </a:prstGeom>
+          <a:noFill/>
+          <a:ln w="0">
+            <a:noFill/>
+          </a:ln>
+        </p:spPr>
+        <p:txBody>
+          <a:bodyPr lIns="0" rIns="0" tIns="0" bIns="0" anchor="t">
+            <a:noAutofit/>
+          </a:bodyPr>
+          <a:lstStyle>
+            <a:lvl1pPr indent="0">
+              <a:buNone/>
+              <a:defRPr b="0" lang="en-US" sz="1400" spc="-1" strike="noStrike">
+                <a:solidFill>
+                  <a:srgbClr val="000000"/>
+                </a:solidFill>
+                <a:latin typeface="Times New Roman"/>
+              </a:defRPr>
+            </a:lvl1pPr>
+          </a:lstStyle>
+          <a:p>
+            <a:pPr indent="0">
+              <a:buNone/>
+            </a:pPr>
+            <a:r>
+              <a:rPr b="0" lang="en-US" sz="1400" spc="-1" strike="noStrike">
+                <a:solidFill>
+                  <a:srgbClr val="000000"/>
+                </a:solidFill>
+                <a:latin typeface="Times New Roman"/>
+              </a:rPr>
+              <a:t>&lt;date/time&gt;</a:t>
+            </a:r>
+            <a:endParaRPr b="0" lang="en-US" sz="1400" spc="-1" strike="noStrike">
+              <a:solidFill>
+                <a:srgbClr val="000000"/>
+              </a:solidFill>
+              <a:latin typeface="Times New Roman"/>
+            </a:endParaRPr>
+          </a:p>
+        </p:txBody>
+      </p:sp>
+      <p:sp>
+        <p:nvSpPr>
+          <p:cNvPr id="4" name="PlaceHolder 5"/>
           <p:cNvSpPr>
             <a:spLocks noGrp="1"/>
           </p:cNvSpPr>
@@ -395,7 +596,7 @@
         <p:spPr>
           <a:xfrm>
             <a:off x="504000" y="1326600"/>
-            <a:ext cx="9071640" cy="3288240"/>
+            <a:ext cx="9072000" cy="3288600"/>
           </a:xfrm>
           <a:prstGeom prst="rect">
             <a:avLst/>
@@ -422,20 +623,18 @@
               <a:buChar char=""/>
             </a:pPr>
             <a:r>
-              <a:rPr b="0" lang="en-US" sz="3200" strike="noStrike" u="none">
-                <a:solidFill>
-                  <a:srgbClr val="000000"/>
-                </a:solidFill>
-                <a:uFillTx/>
+              <a:rPr b="0" lang="en-US" sz="3200" spc="-1" strike="noStrike">
+                <a:solidFill>
+                  <a:srgbClr val="000000"/>
+                </a:solidFill>
                 <a:latin typeface="Arial"/>
               </a:rPr>
               <a:t>Click to edit the outline text format</a:t>
             </a:r>
-            <a:endParaRPr b="0" lang="en-US" sz="3200" strike="noStrike" u="none">
-              <a:solidFill>
-                <a:srgbClr val="000000"/>
-              </a:solidFill>
-              <a:uFillTx/>
+            <a:endParaRPr b="0" lang="en-US" sz="3200" spc="-1" strike="noStrike">
+              <a:solidFill>
+                <a:srgbClr val="000000"/>
+              </a:solidFill>
               <a:latin typeface="Arial"/>
             </a:endParaRPr>
           </a:p>
@@ -452,20 +651,18 @@
               <a:buChar char=""/>
             </a:pPr>
             <a:r>
-              <a:rPr b="0" lang="en-US" sz="2800" strike="noStrike" u="none">
-                <a:solidFill>
-                  <a:srgbClr val="000000"/>
-                </a:solidFill>
-                <a:uFillTx/>
+              <a:rPr b="0" lang="en-US" sz="2800" spc="-1" strike="noStrike">
+                <a:solidFill>
+                  <a:srgbClr val="000000"/>
+                </a:solidFill>
                 <a:latin typeface="Arial"/>
               </a:rPr>
               <a:t>Second Outline Level</a:t>
             </a:r>
-            <a:endParaRPr b="0" lang="en-US" sz="2800" strike="noStrike" u="none">
-              <a:solidFill>
-                <a:srgbClr val="000000"/>
-              </a:solidFill>
-              <a:uFillTx/>
+            <a:endParaRPr b="0" lang="en-US" sz="2800" spc="-1" strike="noStrike">
+              <a:solidFill>
+                <a:srgbClr val="000000"/>
+              </a:solidFill>
               <a:latin typeface="Arial"/>
             </a:endParaRPr>
           </a:p>
@@ -482,20 +679,18 @@
               <a:buChar char=""/>
             </a:pPr>
             <a:r>
-              <a:rPr b="0" lang="en-US" sz="2400" strike="noStrike" u="none">
-                <a:solidFill>
-                  <a:srgbClr val="000000"/>
-                </a:solidFill>
-                <a:uFillTx/>
+              <a:rPr b="0" lang="en-US" sz="2400" spc="-1" strike="noStrike">
+                <a:solidFill>
+                  <a:srgbClr val="000000"/>
+                </a:solidFill>
                 <a:latin typeface="Arial"/>
               </a:rPr>
               <a:t>Third Outline Level</a:t>
             </a:r>
-            <a:endParaRPr b="0" lang="en-US" sz="2400" strike="noStrike" u="none">
-              <a:solidFill>
-                <a:srgbClr val="000000"/>
-              </a:solidFill>
-              <a:uFillTx/>
+            <a:endParaRPr b="0" lang="en-US" sz="2400" spc="-1" strike="noStrike">
+              <a:solidFill>
+                <a:srgbClr val="000000"/>
+              </a:solidFill>
               <a:latin typeface="Arial"/>
             </a:endParaRPr>
           </a:p>
@@ -512,20 +707,18 @@
               <a:buChar char=""/>
             </a:pPr>
             <a:r>
-              <a:rPr b="0" lang="en-US" sz="2000" strike="noStrike" u="none">
-                <a:solidFill>
-                  <a:srgbClr val="000000"/>
-                </a:solidFill>
-                <a:uFillTx/>
+              <a:rPr b="0" lang="en-US" sz="2000" spc="-1" strike="noStrike">
+                <a:solidFill>
+                  <a:srgbClr val="000000"/>
+                </a:solidFill>
                 <a:latin typeface="Arial"/>
               </a:rPr>
               <a:t>Fourth Outline Level</a:t>
             </a:r>
-            <a:endParaRPr b="0" lang="en-US" sz="2000" strike="noStrike" u="none">
-              <a:solidFill>
-                <a:srgbClr val="000000"/>
-              </a:solidFill>
-              <a:uFillTx/>
+            <a:endParaRPr b="0" lang="en-US" sz="2000" spc="-1" strike="noStrike">
+              <a:solidFill>
+                <a:srgbClr val="000000"/>
+              </a:solidFill>
               <a:latin typeface="Arial"/>
             </a:endParaRPr>
           </a:p>
@@ -542,20 +735,18 @@
               <a:buChar char=""/>
             </a:pPr>
             <a:r>
-              <a:rPr b="0" lang="en-US" sz="2000" strike="noStrike" u="none">
-                <a:solidFill>
-                  <a:srgbClr val="000000"/>
-                </a:solidFill>
-                <a:uFillTx/>
+              <a:rPr b="0" lang="en-US" sz="2000" spc="-1" strike="noStrike">
+                <a:solidFill>
+                  <a:srgbClr val="000000"/>
+                </a:solidFill>
                 <a:latin typeface="Arial"/>
               </a:rPr>
               <a:t>Fifth Outline Level</a:t>
             </a:r>
-            <a:endParaRPr b="0" lang="en-US" sz="2000" strike="noStrike" u="none">
-              <a:solidFill>
-                <a:srgbClr val="000000"/>
-              </a:solidFill>
-              <a:uFillTx/>
+            <a:endParaRPr b="0" lang="en-US" sz="2000" spc="-1" strike="noStrike">
+              <a:solidFill>
+                <a:srgbClr val="000000"/>
+              </a:solidFill>
               <a:latin typeface="Arial"/>
             </a:endParaRPr>
           </a:p>
@@ -572,20 +763,18 @@
               <a:buChar char=""/>
             </a:pPr>
             <a:r>
-              <a:rPr b="0" lang="en-US" sz="2000" strike="noStrike" u="none">
-                <a:solidFill>
-                  <a:srgbClr val="000000"/>
-                </a:solidFill>
-                <a:uFillTx/>
+              <a:rPr b="0" lang="en-US" sz="2000" spc="-1" strike="noStrike">
+                <a:solidFill>
+                  <a:srgbClr val="000000"/>
+                </a:solidFill>
                 <a:latin typeface="Arial"/>
               </a:rPr>
               <a:t>Sixth Outline Level</a:t>
             </a:r>
-            <a:endParaRPr b="0" lang="en-US" sz="2000" strike="noStrike" u="none">
-              <a:solidFill>
-                <a:srgbClr val="000000"/>
-              </a:solidFill>
-              <a:uFillTx/>
+            <a:endParaRPr b="0" lang="en-US" sz="2000" spc="-1" strike="noStrike">
+              <a:solidFill>
+                <a:srgbClr val="000000"/>
+              </a:solidFill>
               <a:latin typeface="Arial"/>
             </a:endParaRPr>
           </a:p>
@@ -602,39 +791,256 @@
               <a:buChar char=""/>
             </a:pPr>
             <a:r>
-              <a:rPr b="0" lang="en-US" sz="2000" strike="noStrike" u="none">
-                <a:solidFill>
-                  <a:srgbClr val="000000"/>
-                </a:solidFill>
-                <a:uFillTx/>
+              <a:rPr b="0" lang="en-US" sz="2000" spc="-1" strike="noStrike">
+                <a:solidFill>
+                  <a:srgbClr val="000000"/>
+                </a:solidFill>
                 <a:latin typeface="Arial"/>
               </a:rPr>
               <a:t>Seventh Outline Level</a:t>
             </a:r>
-            <a:endParaRPr b="0" lang="en-US" sz="2000" strike="noStrike" u="none">
-              <a:solidFill>
-                <a:srgbClr val="000000"/>
-              </a:solidFill>
-              <a:uFillTx/>
-              <a:latin typeface="Arial"/>
-            </a:endParaRPr>
-          </a:p>
-        </p:txBody>
-      </p:sp>
-      <p:sp>
-        <p:nvSpPr>
-          <p:cNvPr id="2" name="PlaceHolder 3"/>
+            <a:endParaRPr b="0" lang="en-US" sz="2000" spc="-1" strike="noStrike">
+              <a:solidFill>
+                <a:srgbClr val="000000"/>
+              </a:solidFill>
+              <a:latin typeface="Arial"/>
+            </a:endParaRPr>
+          </a:p>
+        </p:txBody>
+      </p:sp>
+    </p:spTree>
+  </p:cSld>
+  <p:clrMap bg1="lt1" bg2="lt2" tx1="dk1" tx2="dk2" accent1="accent1" accent2="accent2" accent3="accent3" accent4="accent4" accent5="accent5" accent6="accent6" hlink="hlink" folHlink="folHlink"/>
+  <p:sldLayoutIdLst>
+    <p:sldLayoutId id="2147483649" r:id="rId2"/>
+  </p:sldLayoutIdLst>
+</p:sldMaster>
+</file>
+
+<file path=ppt/slideMasters/slideMaster2.xml><?xml version="1.0" encoding="utf-8"?>
+<p:sldMaster xmlns:a="http://schemas.openxmlformats.org/drawingml/2006/main" xmlns:p="http://schemas.openxmlformats.org/presentationml/2006/main" xmlns:r="http://schemas.openxmlformats.org/officeDocument/2006/relationships" xmlns:p14="http://schemas.microsoft.com/office/powerpoint/2010/main" xmlns:p15="http://schemas.microsoft.com/office/powerpoint/2012/main" xmlns:mc="http://schemas.openxmlformats.org/markup-compatibility/2006">
+  <p:cSld>
+    <p:spTree>
+      <p:nvGrpSpPr>
+        <p:cNvPr id="1" name=""/>
+        <p:cNvGrpSpPr/>
+        <p:nvPr/>
+      </p:nvGrpSpPr>
+      <p:grpSpPr>
+        <a:xfrm>
+          <a:off x="0" y="0"/>
+          <a:ext cx="0" cy="0"/>
+          <a:chOff x="0" y="0"/>
+          <a:chExt cx="0" cy="0"/>
+        </a:xfrm>
+      </p:grpSpPr>
+      <p:sp>
+        <p:nvSpPr>
+          <p:cNvPr id="6" name="PlaceHolder 1"/>
           <p:cNvSpPr>
             <a:spLocks noGrp="1"/>
           </p:cNvSpPr>
           <p:nvPr>
-            <p:ph type="dt" idx="1"/>
+            <p:ph type="title"/>
           </p:nvPr>
         </p:nvSpPr>
         <p:spPr>
           <a:xfrm>
+            <a:off x="504000" y="226080"/>
+            <a:ext cx="9071280" cy="946080"/>
+          </a:xfrm>
+          <a:prstGeom prst="rect">
+            <a:avLst/>
+          </a:prstGeom>
+          <a:noFill/>
+          <a:ln w="0">
+            <a:noFill/>
+          </a:ln>
+        </p:spPr>
+        <p:txBody>
+          <a:bodyPr lIns="0" rIns="0" tIns="0" bIns="0" anchor="ctr">
+            <a:noAutofit/>
+          </a:bodyPr>
+          <a:p>
+            <a:pPr indent="0">
+              <a:buNone/>
+            </a:pPr>
+            <a:r>
+              <a:rPr b="0" lang="en-US" sz="1800" spc="-1" strike="noStrike">
+                <a:solidFill>
+                  <a:srgbClr val="000000"/>
+                </a:solidFill>
+                <a:latin typeface="Arial"/>
+              </a:rPr>
+              <a:t>Click to edit the title text format</a:t>
+            </a:r>
+            <a:endParaRPr b="0" lang="en-US" sz="1800" spc="-1" strike="noStrike">
+              <a:solidFill>
+                <a:srgbClr val="000000"/>
+              </a:solidFill>
+              <a:latin typeface="Arial"/>
+            </a:endParaRPr>
+          </a:p>
+        </p:txBody>
+      </p:sp>
+      <p:sp>
+        <p:nvSpPr>
+          <p:cNvPr id="7" name="PlaceHolder 2"/>
+          <p:cNvSpPr>
+            <a:spLocks noGrp="1"/>
+          </p:cNvSpPr>
+          <p:nvPr>
+            <p:ph type="ftr" idx="4"/>
+          </p:nvPr>
+        </p:nvSpPr>
+        <p:spPr>
+          <a:xfrm>
+            <a:off x="3447360" y="5165280"/>
+            <a:ext cx="3194640" cy="390240"/>
+          </a:xfrm>
+          <a:prstGeom prst="rect">
+            <a:avLst/>
+          </a:prstGeom>
+          <a:noFill/>
+          <a:ln w="0">
+            <a:noFill/>
+          </a:ln>
+        </p:spPr>
+        <p:txBody>
+          <a:bodyPr lIns="0" rIns="0" tIns="0" bIns="0" anchor="t">
+            <a:noAutofit/>
+          </a:bodyPr>
+          <a:lstStyle>
+            <a:lvl1pPr indent="0" algn="ctr">
+              <a:lnSpc>
+                <a:spcPct val="100000"/>
+              </a:lnSpc>
+              <a:buNone/>
+              <a:tabLst>
+                <a:tab algn="l" pos="0"/>
+              </a:tabLst>
+              <a:defRPr b="0" lang="en-US" sz="1400" spc="-1" strike="noStrike">
+                <a:solidFill>
+                  <a:srgbClr val="000000"/>
+                </a:solidFill>
+                <a:latin typeface="Times New Roman"/>
+              </a:defRPr>
+            </a:lvl1pPr>
+          </a:lstStyle>
+          <a:p>
+            <a:pPr indent="0" algn="ctr">
+              <a:lnSpc>
+                <a:spcPct val="100000"/>
+              </a:lnSpc>
+              <a:buNone/>
+              <a:tabLst>
+                <a:tab algn="l" pos="0"/>
+              </a:tabLst>
+            </a:pPr>
+            <a:r>
+              <a:rPr b="0" lang="en-US" sz="1400" spc="-1" strike="noStrike">
+                <a:solidFill>
+                  <a:srgbClr val="000000"/>
+                </a:solidFill>
+                <a:latin typeface="Times New Roman"/>
+              </a:rPr>
+              <a:t>&lt;footer&gt;</a:t>
+            </a:r>
+            <a:endParaRPr b="0" lang="en-US" sz="1400" spc="-1" strike="noStrike">
+              <a:solidFill>
+                <a:srgbClr val="000000"/>
+              </a:solidFill>
+              <a:latin typeface="Times New Roman"/>
+            </a:endParaRPr>
+          </a:p>
+        </p:txBody>
+      </p:sp>
+      <p:sp>
+        <p:nvSpPr>
+          <p:cNvPr id="8" name="PlaceHolder 3"/>
+          <p:cNvSpPr>
+            <a:spLocks noGrp="1"/>
+          </p:cNvSpPr>
+          <p:nvPr>
+            <p:ph type="sldNum" idx="5"/>
+          </p:nvPr>
+        </p:nvSpPr>
+        <p:spPr>
+          <a:xfrm>
+            <a:off x="7227360" y="5165280"/>
+            <a:ext cx="2347920" cy="390240"/>
+          </a:xfrm>
+          <a:prstGeom prst="rect">
+            <a:avLst/>
+          </a:prstGeom>
+          <a:noFill/>
+          <a:ln w="0">
+            <a:noFill/>
+          </a:ln>
+        </p:spPr>
+        <p:txBody>
+          <a:bodyPr lIns="0" rIns="0" tIns="0" bIns="0" anchor="t">
+            <a:noAutofit/>
+          </a:bodyPr>
+          <a:lstStyle>
+            <a:lvl1pPr indent="0" algn="r">
+              <a:lnSpc>
+                <a:spcPct val="100000"/>
+              </a:lnSpc>
+              <a:buNone/>
+              <a:tabLst>
+                <a:tab algn="l" pos="0"/>
+              </a:tabLst>
+              <a:defRPr b="0" lang="en-US" sz="1400" spc="-1" strike="noStrike">
+                <a:solidFill>
+                  <a:srgbClr val="000000"/>
+                </a:solidFill>
+                <a:latin typeface="Times New Roman"/>
+              </a:defRPr>
+            </a:lvl1pPr>
+          </a:lstStyle>
+          <a:p>
+            <a:pPr indent="0" algn="r">
+              <a:lnSpc>
+                <a:spcPct val="100000"/>
+              </a:lnSpc>
+              <a:buNone/>
+              <a:tabLst>
+                <a:tab algn="l" pos="0"/>
+              </a:tabLst>
+            </a:pPr>
+            <a:fld id="{6837A1C3-430A-4E3C-8779-2D7B23E4EFC0}" type="slidenum">
+              <a:rPr b="0" lang="en-US" sz="1400" spc="-1" strike="noStrike">
+                <a:solidFill>
+                  <a:srgbClr val="000000"/>
+                </a:solidFill>
+                <a:latin typeface="Times New Roman"/>
+              </a:rPr>
+              <a:t>&lt;number&gt;</a:t>
+            </a:fld>
+            <a:endParaRPr b="0" lang="en-US" sz="1400" spc="-1" strike="noStrike">
+              <a:solidFill>
+                <a:srgbClr val="000000"/>
+              </a:solidFill>
+              <a:latin typeface="Times New Roman"/>
+            </a:endParaRPr>
+          </a:p>
+        </p:txBody>
+      </p:sp>
+      <p:sp>
+        <p:nvSpPr>
+          <p:cNvPr id="9" name="PlaceHolder 4"/>
+          <p:cNvSpPr>
+            <a:spLocks noGrp="1"/>
+          </p:cNvSpPr>
+          <p:nvPr>
+            <p:ph type="dt" idx="6"/>
+          </p:nvPr>
+        </p:nvSpPr>
+        <p:spPr>
+          <a:xfrm>
             <a:off x="504000" y="5165280"/>
-            <a:ext cx="2348280" cy="390600"/>
+            <a:ext cx="2347920" cy="390240"/>
           </a:xfrm>
           <a:prstGeom prst="rect">
             <a:avLst/>
@@ -651,11 +1057,10 @@
           <a:lstStyle>
             <a:lvl1pPr indent="0">
               <a:buNone/>
-              <a:defRPr b="0" lang="en-US" sz="1400" strike="noStrike" u="none">
-                <a:solidFill>
-                  <a:srgbClr val="000000"/>
-                </a:solidFill>
-                <a:uFillTx/>
+              <a:defRPr b="0" lang="en-US" sz="1400" spc="-1" strike="noStrike">
+                <a:solidFill>
+                  <a:srgbClr val="000000"/>
+                </a:solidFill>
                 <a:latin typeface="Times New Roman"/>
               </a:defRPr>
             </a:lvl1pPr>
@@ -665,20 +1070,18 @@
               <a:buNone/>
             </a:pPr>
             <a:r>
-              <a:rPr b="0" lang="en-US" sz="1400" strike="noStrike" u="none">
-                <a:solidFill>
-                  <a:srgbClr val="000000"/>
-                </a:solidFill>
-                <a:uFillTx/>
+              <a:rPr b="0" lang="en-US" sz="1400" spc="-1" strike="noStrike">
+                <a:solidFill>
+                  <a:srgbClr val="000000"/>
+                </a:solidFill>
                 <a:latin typeface="Times New Roman"/>
               </a:rPr>
               <a:t>&lt;date/time&gt;</a:t>
             </a:r>
-            <a:endParaRPr b="0" lang="en-US" sz="1400" strike="noStrike" u="none">
-              <a:solidFill>
-                <a:srgbClr val="000000"/>
-              </a:solidFill>
-              <a:uFillTx/>
+            <a:endParaRPr b="0" lang="en-US" sz="1400" spc="-1" strike="noStrike">
+              <a:solidFill>
+                <a:srgbClr val="000000"/>
+              </a:solidFill>
               <a:latin typeface="Times New Roman"/>
             </a:endParaRPr>
           </a:p>
@@ -686,18 +1089,18 @@
       </p:sp>
       <p:sp>
         <p:nvSpPr>
-          <p:cNvPr id="3" name="PlaceHolder 4"/>
+          <p:cNvPr id="10" name="PlaceHolder 5"/>
           <p:cNvSpPr>
             <a:spLocks noGrp="1"/>
           </p:cNvSpPr>
           <p:nvPr>
-            <p:ph type="ftr" idx="2"/>
+            <p:ph type="body"/>
           </p:nvPr>
         </p:nvSpPr>
         <p:spPr>
           <a:xfrm>
-            <a:off x="3447360" y="5165280"/>
-            <a:ext cx="3195000" cy="390600"/>
+            <a:off x="504000" y="1326600"/>
+            <a:ext cx="9072000" cy="3288600"/>
           </a:xfrm>
           <a:prstGeom prst="rect">
             <a:avLst/>
@@ -709,113 +1112,211 @@
         </p:spPr>
         <p:txBody>
           <a:bodyPr lIns="0" rIns="0" tIns="0" bIns="0" anchor="t">
-            <a:noAutofit/>
+            <a:normAutofit/>
           </a:bodyPr>
-          <a:lstStyle>
-            <a:lvl1pPr indent="0" algn="ctr">
-              <a:buNone/>
-              <a:defRPr b="0" lang="en-US" sz="1400" strike="noStrike" u="none">
-                <a:solidFill>
-                  <a:srgbClr val="000000"/>
-                </a:solidFill>
-                <a:uFillTx/>
-                <a:latin typeface="Times New Roman"/>
-              </a:defRPr>
-            </a:lvl1pPr>
-          </a:lstStyle>
-          <a:p>
-            <a:pPr indent="0" algn="ctr">
-              <a:buNone/>
-            </a:pPr>
-            <a:r>
-              <a:rPr b="0" lang="en-US" sz="1400" strike="noStrike" u="none">
-                <a:solidFill>
-                  <a:srgbClr val="000000"/>
-                </a:solidFill>
-                <a:uFillTx/>
-                <a:latin typeface="Times New Roman"/>
-              </a:rPr>
-              <a:t>&lt;footer&gt;</a:t>
-            </a:r>
-            <a:endParaRPr b="0" lang="en-US" sz="1400" strike="noStrike" u="none">
-              <a:solidFill>
-                <a:srgbClr val="000000"/>
-              </a:solidFill>
-              <a:uFillTx/>
-              <a:latin typeface="Times New Roman"/>
-            </a:endParaRPr>
-          </a:p>
-        </p:txBody>
-      </p:sp>
-      <p:sp>
-        <p:nvSpPr>
-          <p:cNvPr id="4" name="PlaceHolder 5"/>
-          <p:cNvSpPr>
-            <a:spLocks noGrp="1"/>
-          </p:cNvSpPr>
-          <p:nvPr>
-            <p:ph type="sldNum" idx="3"/>
-          </p:nvPr>
-        </p:nvSpPr>
-        <p:spPr>
-          <a:xfrm>
-            <a:off x="7227360" y="5165280"/>
-            <a:ext cx="2348280" cy="390600"/>
-          </a:xfrm>
-          <a:prstGeom prst="rect">
-            <a:avLst/>
-          </a:prstGeom>
-          <a:noFill/>
-          <a:ln w="0">
-            <a:noFill/>
-          </a:ln>
-        </p:spPr>
-        <p:txBody>
-          <a:bodyPr lIns="0" rIns="0" tIns="0" bIns="0" anchor="t">
-            <a:noAutofit/>
-          </a:bodyPr>
-          <a:lstStyle>
-            <a:lvl1pPr indent="0" algn="r">
-              <a:buNone/>
-              <a:defRPr b="0" lang="en-US" sz="1400" strike="noStrike" u="none">
-                <a:solidFill>
-                  <a:srgbClr val="000000"/>
-                </a:solidFill>
-                <a:uFillTx/>
-                <a:latin typeface="Times New Roman"/>
-              </a:defRPr>
-            </a:lvl1pPr>
-          </a:lstStyle>
-          <a:p>
-            <a:pPr indent="0" algn="r">
-              <a:buNone/>
-            </a:pPr>
-            <a:fld id="{1A73CD4C-331F-48D3-B7C2-49062E00AFA2}" type="slidenum">
-              <a:rPr b="0" lang="en-US" sz="1400" strike="noStrike" u="none">
-                <a:solidFill>
-                  <a:srgbClr val="000000"/>
-                </a:solidFill>
-                <a:uFillTx/>
-                <a:latin typeface="Times New Roman"/>
-              </a:rPr>
-              <a:t>&lt;number&gt;</a:t>
-            </a:fld>
-            <a:endParaRPr b="0" lang="en-US" sz="1400" strike="noStrike" u="none">
-              <a:solidFill>
-                <a:srgbClr val="000000"/>
-              </a:solidFill>
-              <a:uFillTx/>
-              <a:latin typeface="Times New Roman"/>
+          <a:p>
+            <a:pPr marL="432000" indent="-324000">
+              <a:spcBef>
+                <a:spcPts val="1417"/>
+              </a:spcBef>
+              <a:buClr>
+                <a:srgbClr val="000000"/>
+              </a:buClr>
+              <a:buSzPct val="45000"/>
+              <a:buFont typeface="Wingdings" charset="2"/>
+              <a:buChar char=""/>
+            </a:pPr>
+            <a:r>
+              <a:rPr b="0" lang="en-US" sz="3200" spc="-1" strike="noStrike">
+                <a:solidFill>
+                  <a:srgbClr val="000000"/>
+                </a:solidFill>
+                <a:latin typeface="Arial"/>
+              </a:rPr>
+              <a:t>Click to edit the outline text format</a:t>
+            </a:r>
+            <a:endParaRPr b="0" lang="en-US" sz="3200" spc="-1" strike="noStrike">
+              <a:solidFill>
+                <a:srgbClr val="000000"/>
+              </a:solidFill>
+              <a:latin typeface="Arial"/>
+            </a:endParaRPr>
+          </a:p>
+          <a:p>
+            <a:pPr lvl="1" marL="864000" indent="-324000">
+              <a:spcBef>
+                <a:spcPts val="1134"/>
+              </a:spcBef>
+              <a:buClr>
+                <a:srgbClr val="000000"/>
+              </a:buClr>
+              <a:buSzPct val="75000"/>
+              <a:buFont typeface="Symbol" charset="2"/>
+              <a:buChar char=""/>
+            </a:pPr>
+            <a:r>
+              <a:rPr b="0" lang="en-US" sz="2800" spc="-1" strike="noStrike">
+                <a:solidFill>
+                  <a:srgbClr val="000000"/>
+                </a:solidFill>
+                <a:latin typeface="Arial"/>
+              </a:rPr>
+              <a:t>Second Outline Level</a:t>
+            </a:r>
+            <a:endParaRPr b="0" lang="en-US" sz="2800" spc="-1" strike="noStrike">
+              <a:solidFill>
+                <a:srgbClr val="000000"/>
+              </a:solidFill>
+              <a:latin typeface="Arial"/>
+            </a:endParaRPr>
+          </a:p>
+          <a:p>
+            <a:pPr lvl="2" marL="1296000" indent="-288000">
+              <a:spcBef>
+                <a:spcPts val="850"/>
+              </a:spcBef>
+              <a:buClr>
+                <a:srgbClr val="000000"/>
+              </a:buClr>
+              <a:buSzPct val="45000"/>
+              <a:buFont typeface="Wingdings" charset="2"/>
+              <a:buChar char=""/>
+            </a:pPr>
+            <a:r>
+              <a:rPr b="0" lang="en-US" sz="2400" spc="-1" strike="noStrike">
+                <a:solidFill>
+                  <a:srgbClr val="000000"/>
+                </a:solidFill>
+                <a:latin typeface="Arial"/>
+              </a:rPr>
+              <a:t>Third Outline Level</a:t>
+            </a:r>
+            <a:endParaRPr b="0" lang="en-US" sz="2400" spc="-1" strike="noStrike">
+              <a:solidFill>
+                <a:srgbClr val="000000"/>
+              </a:solidFill>
+              <a:latin typeface="Arial"/>
+            </a:endParaRPr>
+          </a:p>
+          <a:p>
+            <a:pPr lvl="3" marL="1728000" indent="-216000">
+              <a:spcBef>
+                <a:spcPts val="567"/>
+              </a:spcBef>
+              <a:buClr>
+                <a:srgbClr val="000000"/>
+              </a:buClr>
+              <a:buSzPct val="75000"/>
+              <a:buFont typeface="Symbol" charset="2"/>
+              <a:buChar char=""/>
+            </a:pPr>
+            <a:r>
+              <a:rPr b="0" lang="en-US" sz="2000" spc="-1" strike="noStrike">
+                <a:solidFill>
+                  <a:srgbClr val="000000"/>
+                </a:solidFill>
+                <a:latin typeface="Arial"/>
+              </a:rPr>
+              <a:t>Fourth Outline Level</a:t>
+            </a:r>
+            <a:endParaRPr b="0" lang="en-US" sz="2000" spc="-1" strike="noStrike">
+              <a:solidFill>
+                <a:srgbClr val="000000"/>
+              </a:solidFill>
+              <a:latin typeface="Arial"/>
+            </a:endParaRPr>
+          </a:p>
+          <a:p>
+            <a:pPr lvl="4" marL="2160000" indent="-216000">
+              <a:spcBef>
+                <a:spcPts val="283"/>
+              </a:spcBef>
+              <a:buClr>
+                <a:srgbClr val="000000"/>
+              </a:buClr>
+              <a:buSzPct val="45000"/>
+              <a:buFont typeface="Wingdings" charset="2"/>
+              <a:buChar char=""/>
+            </a:pPr>
+            <a:r>
+              <a:rPr b="0" lang="en-US" sz="2000" spc="-1" strike="noStrike">
+                <a:solidFill>
+                  <a:srgbClr val="000000"/>
+                </a:solidFill>
+                <a:latin typeface="Arial"/>
+              </a:rPr>
+              <a:t>Fifth Outline Level</a:t>
+            </a:r>
+            <a:endParaRPr b="0" lang="en-US" sz="2000" spc="-1" strike="noStrike">
+              <a:solidFill>
+                <a:srgbClr val="000000"/>
+              </a:solidFill>
+              <a:latin typeface="Arial"/>
+            </a:endParaRPr>
+          </a:p>
+          <a:p>
+            <a:pPr lvl="5" marL="2592000" indent="-216000">
+              <a:spcBef>
+                <a:spcPts val="283"/>
+              </a:spcBef>
+              <a:buClr>
+                <a:srgbClr val="000000"/>
+              </a:buClr>
+              <a:buSzPct val="45000"/>
+              <a:buFont typeface="Wingdings" charset="2"/>
+              <a:buChar char=""/>
+            </a:pPr>
+            <a:r>
+              <a:rPr b="0" lang="en-US" sz="2000" spc="-1" strike="noStrike">
+                <a:solidFill>
+                  <a:srgbClr val="000000"/>
+                </a:solidFill>
+                <a:latin typeface="Arial"/>
+              </a:rPr>
+              <a:t>Sixth Outline Level</a:t>
+            </a:r>
+            <a:endParaRPr b="0" lang="en-US" sz="2000" spc="-1" strike="noStrike">
+              <a:solidFill>
+                <a:srgbClr val="000000"/>
+              </a:solidFill>
+              <a:latin typeface="Arial"/>
+            </a:endParaRPr>
+          </a:p>
+          <a:p>
+            <a:pPr lvl="6" marL="3024000" indent="-216000">
+              <a:spcBef>
+                <a:spcPts val="283"/>
+              </a:spcBef>
+              <a:buClr>
+                <a:srgbClr val="000000"/>
+              </a:buClr>
+              <a:buSzPct val="45000"/>
+              <a:buFont typeface="Wingdings" charset="2"/>
+              <a:buChar char=""/>
+            </a:pPr>
+            <a:r>
+              <a:rPr b="0" lang="en-US" sz="2000" spc="-1" strike="noStrike">
+                <a:solidFill>
+                  <a:srgbClr val="000000"/>
+                </a:solidFill>
+                <a:latin typeface="Arial"/>
+              </a:rPr>
+              <a:t>Seventh Outline Level</a:t>
+            </a:r>
+            <a:endParaRPr b="0" lang="en-US" sz="2000" spc="-1" strike="noStrike">
+              <a:solidFill>
+                <a:srgbClr val="000000"/>
+              </a:solidFill>
+              <a:latin typeface="Arial"/>
             </a:endParaRPr>
           </a:p>
         </p:txBody>
       </p:sp>
     </p:spTree>
   </p:cSld>
-  <p:clrMap bg1="lt1" tx1="dk1" bg2="lt2" tx2="dk2" accent1="accent1" accent2="accent2" accent3="accent3" accent4="accent4" accent5="accent5" accent6="accent6" hlink="hlink" folHlink="folHlink"/>
+  <p:clrMap bg1="lt1" bg2="lt2" tx1="dk1" tx2="dk2" accent1="accent1" accent2="accent2" accent3="accent3" accent4="accent4" accent5="accent5" accent6="accent6" hlink="hlink" folHlink="folHlink"/>
   <p:sldLayoutIdLst>
-    <p:sldLayoutId id="2147483649" r:id="rId2"/>
-    <p:sldLayoutId id="2147483650" r:id="rId3"/>
+    <p:sldLayoutId id="2147483651" r:id="rId2"/>
   </p:sldLayoutIdLst>
 </p:sldMaster>
 </file>
@@ -839,7 +1340,7 @@
       </p:grpSpPr>
       <p:sp>
         <p:nvSpPr>
-          <p:cNvPr id="8" name="PlaceHolder 1"/>
+          <p:cNvPr id="13" name="PlaceHolder 1"/>
           <p:cNvSpPr>
             <a:spLocks noGrp="1"/>
           </p:cNvSpPr>
@@ -850,7 +1351,7 @@
         <p:spPr>
           <a:xfrm>
             <a:off x="504000" y="226080"/>
-            <a:ext cx="9071640" cy="946440"/>
+            <a:ext cx="9071280" cy="946080"/>
           </a:xfrm>
           <a:prstGeom prst="rect">
             <a:avLst/>
@@ -866,31 +1367,35 @@
           </a:bodyPr>
           <a:p>
             <a:pPr indent="0" algn="ctr">
+              <a:lnSpc>
+                <a:spcPct val="100000"/>
+              </a:lnSpc>
               <a:buNone/>
-            </a:pPr>
-            <a:r>
-              <a:rPr b="0" lang="en-US" sz="4400" strike="noStrike" u="none">
-                <a:solidFill>
-                  <a:srgbClr val="000000"/>
-                </a:solidFill>
-                <a:uFillTx/>
+              <a:tabLst>
+                <a:tab algn="l" pos="0"/>
+              </a:tabLst>
+            </a:pPr>
+            <a:r>
+              <a:rPr b="0" lang="en-US" sz="4400" spc="-1" strike="noStrike">
+                <a:solidFill>
+                  <a:srgbClr val="000000"/>
+                </a:solidFill>
                 <a:latin typeface="Arial"/>
               </a:rPr>
               <a:t>ООП в Python</a:t>
             </a:r>
-            <a:endParaRPr b="0" lang="en-US" sz="4400" strike="noStrike" u="none">
-              <a:solidFill>
-                <a:srgbClr val="000000"/>
-              </a:solidFill>
-              <a:uFillTx/>
-              <a:latin typeface="Arial"/>
-            </a:endParaRPr>
-          </a:p>
-        </p:txBody>
-      </p:sp>
-      <p:sp>
-        <p:nvSpPr>
-          <p:cNvPr id="9" name="PlaceHolder 2"/>
+            <a:endParaRPr b="0" lang="en-US" sz="4400" spc="-1" strike="noStrike">
+              <a:solidFill>
+                <a:srgbClr val="000000"/>
+              </a:solidFill>
+              <a:latin typeface="Arial"/>
+            </a:endParaRPr>
+          </a:p>
+        </p:txBody>
+      </p:sp>
+      <p:sp>
+        <p:nvSpPr>
+          <p:cNvPr id="14" name="PlaceHolder 2"/>
           <p:cNvSpPr>
             <a:spLocks noGrp="1"/>
           </p:cNvSpPr>
@@ -901,7 +1406,7 @@
         <p:spPr>
           <a:xfrm>
             <a:off x="504000" y="1828800"/>
-            <a:ext cx="9071640" cy="3288240"/>
+            <a:ext cx="9071280" cy="3287880"/>
           </a:xfrm>
           <a:prstGeom prst="rect">
             <a:avLst/>
@@ -917,67 +1422,79 @@
           </a:bodyPr>
           <a:p>
             <a:pPr indent="0" algn="ctr">
+              <a:lnSpc>
+                <a:spcPct val="100000"/>
+              </a:lnSpc>
               <a:buNone/>
-            </a:pPr>
-            <a:r>
-              <a:rPr b="0" lang="en-US" sz="3200" strike="noStrike" u="none">
-                <a:solidFill>
-                  <a:srgbClr val="000000"/>
-                </a:solidFill>
-                <a:uFillTx/>
+              <a:tabLst>
+                <a:tab algn="l" pos="0"/>
+              </a:tabLst>
+            </a:pPr>
+            <a:r>
+              <a:rPr b="0" lang="en-US" sz="3200" spc="-1" strike="noStrike">
+                <a:solidFill>
+                  <a:srgbClr val="000000"/>
+                </a:solidFill>
                 <a:latin typeface="Arial"/>
               </a:rPr>
               <a:t>подготовил</a:t>
             </a:r>
-            <a:endParaRPr b="0" lang="en-US" sz="3200" strike="noStrike" u="none">
-              <a:solidFill>
-                <a:srgbClr val="000000"/>
-              </a:solidFill>
-              <a:uFillTx/>
+            <a:endParaRPr b="0" lang="en-US" sz="3200" spc="-1" strike="noStrike">
+              <a:solidFill>
+                <a:srgbClr val="000000"/>
+              </a:solidFill>
               <a:latin typeface="Arial"/>
             </a:endParaRPr>
           </a:p>
           <a:p>
             <a:pPr indent="0" algn="ctr">
+              <a:lnSpc>
+                <a:spcPct val="100000"/>
+              </a:lnSpc>
               <a:buNone/>
-            </a:pPr>
-            <a:r>
-              <a:rPr b="0" lang="en-US" sz="3200" strike="noStrike" u="none">
-                <a:solidFill>
-                  <a:srgbClr val="000000"/>
-                </a:solidFill>
-                <a:uFillTx/>
+              <a:tabLst>
+                <a:tab algn="l" pos="0"/>
+              </a:tabLst>
+            </a:pPr>
+            <a:r>
+              <a:rPr b="0" lang="en-US" sz="3200" spc="-1" strike="noStrike">
+                <a:solidFill>
+                  <a:srgbClr val="000000"/>
+                </a:solidFill>
                 <a:latin typeface="Arial"/>
               </a:rPr>
               <a:t>студент 451 группы</a:t>
             </a:r>
-            <a:endParaRPr b="0" lang="en-US" sz="3200" strike="noStrike" u="none">
-              <a:solidFill>
-                <a:srgbClr val="000000"/>
-              </a:solidFill>
-              <a:uFillTx/>
+            <a:endParaRPr b="0" lang="en-US" sz="3200" spc="-1" strike="noStrike">
+              <a:solidFill>
+                <a:srgbClr val="000000"/>
+              </a:solidFill>
               <a:latin typeface="Arial"/>
             </a:endParaRPr>
           </a:p>
           <a:p>
             <a:pPr indent="0" algn="ctr">
+              <a:lnSpc>
+                <a:spcPct val="100000"/>
+              </a:lnSpc>
               <a:buNone/>
-            </a:pPr>
-            <a:r>
-              <a:rPr b="0" lang="en-US" sz="3200" strike="noStrike" u="none">
-                <a:solidFill>
-                  <a:srgbClr val="000000"/>
-                </a:solidFill>
-                <a:uFillTx/>
+              <a:tabLst>
+                <a:tab algn="l" pos="0"/>
+              </a:tabLst>
+            </a:pPr>
+            <a:r>
+              <a:rPr b="0" lang="en-US" sz="3200" spc="-1" strike="noStrike">
+                <a:solidFill>
+                  <a:srgbClr val="000000"/>
+                </a:solidFill>
                 <a:latin typeface="Arial"/>
               </a:rPr>
               <a:t>Устюшин Богдан</a:t>
             </a:r>
-            <a:endParaRPr b="0" lang="en-US" sz="3200" strike="noStrike" u="none">
-              <a:solidFill>
-                <a:srgbClr val="000000"/>
-              </a:solidFill>
-              <a:uFillTx/>
+            <a:endParaRPr b="0" lang="en-US" sz="3200" spc="-1" strike="noStrike">
+              <a:solidFill>
+                <a:srgbClr val="000000"/>
+              </a:solidFill>
               <a:latin typeface="Arial"/>
             </a:endParaRPr>
           </a:p>
@@ -1015,7 +1532,7 @@
       </p:grpSpPr>
       <p:sp>
         <p:nvSpPr>
-          <p:cNvPr id="28" name="PlaceHolder 1"/>
+          <p:cNvPr id="31" name="PlaceHolder 1"/>
           <p:cNvSpPr>
             <a:spLocks noGrp="1"/>
           </p:cNvSpPr>
@@ -1025,8 +1542,8 @@
         </p:nvSpPr>
         <p:spPr>
           <a:xfrm>
-            <a:off x="504000" y="226080"/>
-            <a:ext cx="9071640" cy="946440"/>
+            <a:off x="25920" y="349920"/>
+            <a:ext cx="4317480" cy="1249920"/>
           </a:xfrm>
           <a:prstGeom prst="rect">
             <a:avLst/>
@@ -1042,23 +1559,27 @@
           </a:bodyPr>
           <a:p>
             <a:pPr indent="0" algn="ctr">
+              <a:lnSpc>
+                <a:spcPct val="100000"/>
+              </a:lnSpc>
               <a:buNone/>
-            </a:pPr>
-            <a:r>
-              <a:rPr b="0" lang="en-US" sz="4400" strike="noStrike" u="none">
-                <a:solidFill>
-                  <a:srgbClr val="000000"/>
-                </a:solidFill>
-                <a:uFillTx/>
-                <a:latin typeface="Arial"/>
-              </a:rPr>
-              <a:t>Множественное наследование</a:t>
-            </a:r>
-            <a:endParaRPr b="0" lang="en-US" sz="4400" strike="noStrike" u="none">
-              <a:solidFill>
-                <a:srgbClr val="000000"/>
-              </a:solidFill>
-              <a:uFillTx/>
+              <a:tabLst>
+                <a:tab algn="l" pos="0"/>
+              </a:tabLst>
+            </a:pPr>
+            <a:r>
+              <a:rPr b="0" lang="en-US" sz="4400" spc="-1" strike="noStrike">
+                <a:solidFill>
+                  <a:srgbClr val="000000"/>
+                </a:solidFill>
+                <a:latin typeface="Arial"/>
+              </a:rPr>
+              <a:t>Абстрактные методы</a:t>
+            </a:r>
+            <a:endParaRPr b="0" lang="en-US" sz="4400" spc="-1" strike="noStrike">
+              <a:solidFill>
+                <a:srgbClr val="000000"/>
+              </a:solidFill>
               <a:latin typeface="Arial"/>
             </a:endParaRPr>
           </a:p>
@@ -1066,18 +1587,19 @@
       </p:sp>
       <p:pic>
         <p:nvPicPr>
-          <p:cNvPr id="29" name="" descr=""/>
+          <p:cNvPr id="32" name="" descr=""/>
           <p:cNvPicPr/>
           <p:nvPr/>
         </p:nvPicPr>
         <p:blipFill>
           <a:blip r:embed="rId1"/>
+          <a:srcRect l="0" t="0" r="8000" b="0"/>
           <a:stretch/>
         </p:blipFill>
         <p:spPr>
           <a:xfrm>
-            <a:off x="1782720" y="1134360"/>
-            <a:ext cx="6675480" cy="4123440"/>
+            <a:off x="4343760" y="685800"/>
+            <a:ext cx="5257080" cy="4246560"/>
           </a:xfrm>
           <a:prstGeom prst="rect">
             <a:avLst/>
@@ -1087,6 +1609,238 @@
           </a:ln>
         </p:spPr>
       </p:pic>
+      <p:sp>
+        <p:nvSpPr>
+          <p:cNvPr id="33" name=""/>
+          <p:cNvSpPr/>
+          <p:nvPr/>
+        </p:nvSpPr>
+        <p:spPr>
+          <a:xfrm>
+            <a:off x="228600" y="1867320"/>
+            <a:ext cx="3885840" cy="3161520"/>
+          </a:xfrm>
+          <a:prstGeom prst="rect">
+            <a:avLst/>
+          </a:prstGeom>
+          <a:noFill/>
+          <a:ln w="0">
+            <a:noFill/>
+          </a:ln>
+        </p:spPr>
+        <p:style>
+          <a:lnRef idx="0"/>
+          <a:fillRef idx="0"/>
+          <a:effectRef idx="0"/>
+          <a:fontRef idx="minor"/>
+        </p:style>
+        <p:txBody>
+          <a:bodyPr lIns="90000" rIns="90000" tIns="45000" bIns="45000" anchor="t">
+            <a:noAutofit/>
+          </a:bodyPr>
+          <a:p>
+            <a:pPr algn="ctr">
+              <a:lnSpc>
+                <a:spcPct val="100000"/>
+              </a:lnSpc>
+            </a:pPr>
+            <a:r>
+              <a:rPr b="1" lang="en-US" sz="1800" spc="-1" strike="noStrike">
+                <a:solidFill>
+                  <a:srgbClr val="000000"/>
+                </a:solidFill>
+                <a:latin typeface="Arial"/>
+              </a:rPr>
+              <a:t>Важно!</a:t>
+            </a:r>
+            <a:endParaRPr b="0" lang="en-US" sz="1800" spc="-1" strike="noStrike">
+              <a:solidFill>
+                <a:srgbClr val="000000"/>
+              </a:solidFill>
+              <a:latin typeface="Arial"/>
+            </a:endParaRPr>
+          </a:p>
+          <a:p>
+            <a:pPr algn="ctr">
+              <a:lnSpc>
+                <a:spcPct val="100000"/>
+              </a:lnSpc>
+            </a:pPr>
+            <a:r>
+              <a:rPr b="0" lang="en-US" sz="1800" spc="-1" strike="noStrike">
+                <a:solidFill>
+                  <a:srgbClr val="000000"/>
+                </a:solidFill>
+                <a:latin typeface="Arial"/>
+              </a:rPr>
+              <a:t>Абстрактные классы в Python </a:t>
+            </a:r>
+            <a:endParaRPr b="0" lang="en-US" sz="1800" spc="-1" strike="noStrike">
+              <a:solidFill>
+                <a:srgbClr val="000000"/>
+              </a:solidFill>
+              <a:latin typeface="Arial"/>
+            </a:endParaRPr>
+          </a:p>
+          <a:p>
+            <a:pPr algn="ctr">
+              <a:lnSpc>
+                <a:spcPct val="100000"/>
+              </a:lnSpc>
+            </a:pPr>
+            <a:r>
+              <a:rPr b="0" lang="en-US" sz="1800" spc="-1" strike="noStrike">
+                <a:solidFill>
+                  <a:srgbClr val="000000"/>
+                </a:solidFill>
+                <a:latin typeface="Arial"/>
+              </a:rPr>
+              <a:t>реализуются с помощью</a:t>
+            </a:r>
+            <a:endParaRPr b="0" lang="en-US" sz="1800" spc="-1" strike="noStrike">
+              <a:solidFill>
+                <a:srgbClr val="000000"/>
+              </a:solidFill>
+              <a:latin typeface="Arial"/>
+            </a:endParaRPr>
+          </a:p>
+          <a:p>
+            <a:pPr algn="ctr">
+              <a:lnSpc>
+                <a:spcPct val="100000"/>
+              </a:lnSpc>
+            </a:pPr>
+            <a:r>
+              <a:rPr b="0" lang="en-US" sz="1800" spc="-1" strike="noStrike">
+                <a:solidFill>
+                  <a:srgbClr val="000000"/>
+                </a:solidFill>
+                <a:latin typeface="Arial"/>
+              </a:rPr>
+              <a:t>библиотеки </a:t>
+            </a:r>
+            <a:r>
+              <a:rPr b="0" lang="en-US" sz="1800" spc="-1" strike="noStrike">
+                <a:solidFill>
+                  <a:srgbClr val="158466"/>
+                </a:solidFill>
+                <a:latin typeface="Arial"/>
+              </a:rPr>
+              <a:t>«abc»</a:t>
+            </a:r>
+            <a:endParaRPr b="0" lang="en-US" sz="1800" spc="-1" strike="noStrike">
+              <a:solidFill>
+                <a:srgbClr val="000000"/>
+              </a:solidFill>
+              <a:latin typeface="Arial"/>
+            </a:endParaRPr>
+          </a:p>
+          <a:p>
+            <a:pPr algn="ctr">
+              <a:lnSpc>
+                <a:spcPct val="100000"/>
+              </a:lnSpc>
+            </a:pPr>
+            <a:endParaRPr b="0" lang="en-US" sz="1800" spc="-1" strike="noStrike">
+              <a:solidFill>
+                <a:srgbClr val="000000"/>
+              </a:solidFill>
+              <a:latin typeface="Arial"/>
+            </a:endParaRPr>
+          </a:p>
+          <a:p>
+            <a:pPr algn="ctr">
+              <a:lnSpc>
+                <a:spcPct val="100000"/>
+              </a:lnSpc>
+            </a:pPr>
+            <a:r>
+              <a:rPr b="0" lang="en-US" sz="1800" spc="-1" strike="noStrike">
+                <a:solidFill>
+                  <a:srgbClr val="000000"/>
+                </a:solidFill>
+                <a:latin typeface="Arial"/>
+              </a:rPr>
+              <a:t>ABC — Abstract Base Classes</a:t>
+            </a:r>
+            <a:endParaRPr b="0" lang="en-US" sz="1800" spc="-1" strike="noStrike">
+              <a:solidFill>
+                <a:srgbClr val="000000"/>
+              </a:solidFill>
+              <a:latin typeface="Arial"/>
+            </a:endParaRPr>
+          </a:p>
+          <a:p>
+            <a:pPr algn="ctr">
+              <a:lnSpc>
+                <a:spcPct val="100000"/>
+              </a:lnSpc>
+            </a:pPr>
+            <a:r>
+              <a:rPr b="0" lang="en-US" sz="1800" spc="-1" strike="noStrike">
+                <a:solidFill>
+                  <a:srgbClr val="000000"/>
+                </a:solidFill>
+                <a:latin typeface="Arial"/>
+              </a:rPr>
+              <a:t>Импортируемый abstractmethod — декоратор абстрактного метода</a:t>
+            </a:r>
+            <a:endParaRPr b="0" lang="en-US" sz="1800" spc="-1" strike="noStrike">
+              <a:solidFill>
+                <a:srgbClr val="000000"/>
+              </a:solidFill>
+              <a:latin typeface="Arial"/>
+            </a:endParaRPr>
+          </a:p>
+          <a:p>
+            <a:pPr algn="ctr">
+              <a:lnSpc>
+                <a:spcPct val="100000"/>
+              </a:lnSpc>
+            </a:pPr>
+            <a:endParaRPr b="0" lang="en-US" sz="1800" spc="-1" strike="noStrike">
+              <a:solidFill>
+                <a:srgbClr val="000000"/>
+              </a:solidFill>
+              <a:latin typeface="Arial"/>
+            </a:endParaRPr>
+          </a:p>
+          <a:p>
+            <a:pPr algn="ctr">
+              <a:lnSpc>
+                <a:spcPct val="100000"/>
+              </a:lnSpc>
+            </a:pPr>
+            <a:r>
+              <a:rPr b="0" lang="en-US" sz="1800" spc="-1" strike="noStrike">
+                <a:solidFill>
+                  <a:srgbClr val="000000"/>
+                </a:solidFill>
+                <a:latin typeface="Arial"/>
+              </a:rPr>
+              <a:t>А интерфейсов в Python нет :(</a:t>
+            </a:r>
+            <a:br>
+              <a:rPr sz="1800"/>
+            </a:br>
+            <a:r>
+              <a:rPr b="0" lang="en-US" sz="1800" spc="-1" strike="noStrike">
+                <a:solidFill>
+                  <a:srgbClr val="000000"/>
+                </a:solidFill>
+                <a:latin typeface="Arial"/>
+              </a:rPr>
+              <a:t>(по крайней мере, в базовой библиотеке)</a:t>
+            </a:r>
+            <a:endParaRPr b="0" lang="en-US" sz="1800" spc="-1" strike="noStrike">
+              <a:solidFill>
+                <a:srgbClr val="000000"/>
+              </a:solidFill>
+              <a:latin typeface="Arial"/>
+            </a:endParaRPr>
+          </a:p>
+        </p:txBody>
+      </p:sp>
     </p:spTree>
   </p:cSld>
   <mc:AlternateContent>
@@ -1119,7 +1873,7 @@
       </p:grpSpPr>
       <p:sp>
         <p:nvSpPr>
-          <p:cNvPr id="30" name="PlaceHolder 1"/>
+          <p:cNvPr id="34" name="PlaceHolder 1"/>
           <p:cNvSpPr>
             <a:spLocks noGrp="1"/>
           </p:cNvSpPr>
@@ -1130,7 +1884,7 @@
         <p:spPr>
           <a:xfrm>
             <a:off x="504000" y="226080"/>
-            <a:ext cx="9071640" cy="946440"/>
+            <a:ext cx="9071280" cy="946080"/>
           </a:xfrm>
           <a:prstGeom prst="rect">
             <a:avLst/>
@@ -1146,23 +1900,27 @@
           </a:bodyPr>
           <a:p>
             <a:pPr indent="0" algn="ctr">
+              <a:lnSpc>
+                <a:spcPct val="100000"/>
+              </a:lnSpc>
               <a:buNone/>
-            </a:pPr>
-            <a:r>
-              <a:rPr b="0" lang="en-US" sz="4400" strike="noStrike" u="none">
-                <a:solidFill>
-                  <a:srgbClr val="000000"/>
-                </a:solidFill>
-                <a:uFillTx/>
-                <a:latin typeface="Arial"/>
-              </a:rPr>
-              <a:t>Встроенные функции</a:t>
-            </a:r>
-            <a:endParaRPr b="0" lang="en-US" sz="4400" strike="noStrike" u="none">
-              <a:solidFill>
-                <a:srgbClr val="000000"/>
-              </a:solidFill>
-              <a:uFillTx/>
+              <a:tabLst>
+                <a:tab algn="l" pos="0"/>
+              </a:tabLst>
+            </a:pPr>
+            <a:r>
+              <a:rPr b="0" lang="en-US" sz="4400" spc="-1" strike="noStrike">
+                <a:solidFill>
+                  <a:srgbClr val="000000"/>
+                </a:solidFill>
+                <a:latin typeface="Arial"/>
+              </a:rPr>
+              <a:t>Множественное наследование</a:t>
+            </a:r>
+            <a:endParaRPr b="0" lang="en-US" sz="4400" spc="-1" strike="noStrike">
+              <a:solidFill>
+                <a:srgbClr val="000000"/>
+              </a:solidFill>
               <a:latin typeface="Arial"/>
             </a:endParaRPr>
           </a:p>
@@ -1170,7 +1928,7 @@
       </p:sp>
       <p:pic>
         <p:nvPicPr>
-          <p:cNvPr id="31" name="" descr=""/>
+          <p:cNvPr id="35" name="" descr=""/>
           <p:cNvPicPr/>
           <p:nvPr/>
         </p:nvPicPr>
@@ -1180,8 +1938,8 @@
         </p:blipFill>
         <p:spPr>
           <a:xfrm>
-            <a:off x="2514600" y="1600200"/>
-            <a:ext cx="4951800" cy="3271680"/>
+            <a:off x="1782720" y="1134360"/>
+            <a:ext cx="6675120" cy="4123080"/>
           </a:xfrm>
           <a:prstGeom prst="rect">
             <a:avLst/>
@@ -1223,7 +1981,7 @@
       </p:grpSpPr>
       <p:sp>
         <p:nvSpPr>
-          <p:cNvPr id="32" name="PlaceHolder 1"/>
+          <p:cNvPr id="36" name="PlaceHolder 1"/>
           <p:cNvSpPr>
             <a:spLocks noGrp="1"/>
           </p:cNvSpPr>
@@ -1234,7 +1992,7 @@
         <p:spPr>
           <a:xfrm>
             <a:off x="504000" y="226080"/>
-            <a:ext cx="9071640" cy="946440"/>
+            <a:ext cx="9071280" cy="946080"/>
           </a:xfrm>
           <a:prstGeom prst="rect">
             <a:avLst/>
@@ -1250,28 +2008,55 @@
           </a:bodyPr>
           <a:p>
             <a:pPr indent="0" algn="ctr">
+              <a:lnSpc>
+                <a:spcPct val="100000"/>
+              </a:lnSpc>
               <a:buNone/>
-            </a:pPr>
-            <a:r>
-              <a:rPr b="0" lang="en-US" sz="4400" strike="noStrike" u="none">
-                <a:solidFill>
-                  <a:srgbClr val="000000"/>
-                </a:solidFill>
-                <a:uFillTx/>
-                <a:latin typeface="Arial"/>
-              </a:rPr>
-              <a:t>Property</a:t>
-            </a:r>
-            <a:endParaRPr b="0" lang="en-US" sz="4400" strike="noStrike" u="none">
-              <a:solidFill>
-                <a:srgbClr val="000000"/>
-              </a:solidFill>
-              <a:uFillTx/>
-              <a:latin typeface="Arial"/>
-            </a:endParaRPr>
-          </a:p>
-        </p:txBody>
-      </p:sp>
+              <a:tabLst>
+                <a:tab algn="l" pos="0"/>
+              </a:tabLst>
+            </a:pPr>
+            <a:r>
+              <a:rPr b="0" lang="en-US" sz="4400" spc="-1" strike="noStrike">
+                <a:solidFill>
+                  <a:srgbClr val="000000"/>
+                </a:solidFill>
+                <a:latin typeface="Arial"/>
+              </a:rPr>
+              <a:t>Встроенные функции</a:t>
+            </a:r>
+            <a:endParaRPr b="0" lang="en-US" sz="4400" spc="-1" strike="noStrike">
+              <a:solidFill>
+                <a:srgbClr val="000000"/>
+              </a:solidFill>
+              <a:latin typeface="Arial"/>
+            </a:endParaRPr>
+          </a:p>
+        </p:txBody>
+      </p:sp>
+      <p:pic>
+        <p:nvPicPr>
+          <p:cNvPr id="37" name="" descr=""/>
+          <p:cNvPicPr/>
+          <p:nvPr/>
+        </p:nvPicPr>
+        <p:blipFill>
+          <a:blip r:embed="rId1"/>
+          <a:stretch/>
+        </p:blipFill>
+        <p:spPr>
+          <a:xfrm>
+            <a:off x="2514600" y="1600200"/>
+            <a:ext cx="4951440" cy="3271320"/>
+          </a:xfrm>
+          <a:prstGeom prst="rect">
+            <a:avLst/>
+          </a:prstGeom>
+          <a:ln w="0">
+            <a:noFill/>
+          </a:ln>
+        </p:spPr>
+      </p:pic>
     </p:spTree>
   </p:cSld>
   <mc:AlternateContent>
@@ -1304,7 +2089,7 @@
       </p:grpSpPr>
       <p:sp>
         <p:nvSpPr>
-          <p:cNvPr id="33" name="PlaceHolder 1"/>
+          <p:cNvPr id="38" name="PlaceHolder 1"/>
           <p:cNvSpPr>
             <a:spLocks noGrp="1"/>
           </p:cNvSpPr>
@@ -1315,7 +2100,7 @@
         <p:spPr>
           <a:xfrm>
             <a:off x="504000" y="226080"/>
-            <a:ext cx="9071640" cy="946440"/>
+            <a:ext cx="9071280" cy="946080"/>
           </a:xfrm>
           <a:prstGeom prst="rect">
             <a:avLst/>
@@ -1331,114 +2116,27 @@
           </a:bodyPr>
           <a:p>
             <a:pPr indent="0" algn="ctr">
+              <a:lnSpc>
+                <a:spcPct val="100000"/>
+              </a:lnSpc>
               <a:buNone/>
-            </a:pPr>
-            <a:r>
-              <a:rPr b="0" lang="en-US" sz="4400" strike="noStrike" u="none">
-                <a:solidFill>
-                  <a:srgbClr val="000000"/>
-                </a:solidFill>
-                <a:uFillTx/>
-                <a:latin typeface="Arial"/>
-              </a:rPr>
-              <a:t>Пишем документацию</a:t>
-            </a:r>
-            <a:endParaRPr b="0" lang="en-US" sz="4400" strike="noStrike" u="none">
-              <a:solidFill>
-                <a:srgbClr val="000000"/>
-              </a:solidFill>
-              <a:uFillTx/>
-              <a:latin typeface="Arial"/>
-            </a:endParaRPr>
-          </a:p>
-        </p:txBody>
-      </p:sp>
-      <p:pic>
-        <p:nvPicPr>
-          <p:cNvPr id="34" name="" descr=""/>
-          <p:cNvPicPr/>
-          <p:nvPr/>
-        </p:nvPicPr>
-        <p:blipFill>
-          <a:blip r:embed="rId1"/>
-          <a:stretch/>
-        </p:blipFill>
-        <p:spPr>
-          <a:xfrm>
-            <a:off x="457200" y="1600200"/>
-            <a:ext cx="4018680" cy="3427920"/>
-          </a:xfrm>
-          <a:prstGeom prst="rect">
-            <a:avLst/>
-          </a:prstGeom>
-          <a:ln w="0">
-            <a:noFill/>
-          </a:ln>
-        </p:spPr>
-      </p:pic>
-      <p:pic>
-        <p:nvPicPr>
-          <p:cNvPr id="35" name="" descr=""/>
-          <p:cNvPicPr/>
-          <p:nvPr/>
-        </p:nvPicPr>
-        <p:blipFill>
-          <a:blip r:embed="rId2"/>
-          <a:srcRect l="0" t="0" r="54632" b="0"/>
-          <a:stretch/>
-        </p:blipFill>
-        <p:spPr>
-          <a:xfrm>
-            <a:off x="5029200" y="2136600"/>
-            <a:ext cx="4572000" cy="2664000"/>
-          </a:xfrm>
-          <a:prstGeom prst="rect">
-            <a:avLst/>
-          </a:prstGeom>
-          <a:ln w="0">
-            <a:noFill/>
-          </a:ln>
-        </p:spPr>
-      </p:pic>
-      <p:sp>
-        <p:nvSpPr>
-          <p:cNvPr id="36" name=""/>
-          <p:cNvSpPr txBox="1"/>
-          <p:nvPr/>
-        </p:nvSpPr>
-        <p:spPr>
-          <a:xfrm>
-            <a:off x="5486400" y="1679400"/>
-            <a:ext cx="4343400" cy="457200"/>
-          </a:xfrm>
-          <a:prstGeom prst="rect">
-            <a:avLst/>
-          </a:prstGeom>
-          <a:noFill/>
-          <a:ln w="0">
-            <a:noFill/>
-          </a:ln>
-        </p:spPr>
-        <p:txBody>
-          <a:bodyPr lIns="90000" rIns="90000" tIns="45000" bIns="45000" anchor="t">
-            <a:noAutofit/>
-          </a:bodyPr>
-          <a:p>
-            <a:r>
-              <a:rPr b="0" lang="en-US" sz="1800" strike="noStrike" u="none">
-                <a:solidFill>
-                  <a:srgbClr val="000000"/>
-                </a:solidFill>
-                <a:uFillTx/>
-                <a:latin typeface="Arial"/>
-              </a:rPr>
-              <a:t>Результат выполнения метода слева</a:t>
-            </a:r>
-            <a:endParaRPr b="0" lang="en-US" sz="1800" strike="noStrike" u="none">
-              <a:solidFill>
-                <a:srgbClr val="000000"/>
-              </a:solidFill>
-              <a:uFillTx/>
+              <a:tabLst>
+                <a:tab algn="l" pos="0"/>
+              </a:tabLst>
+            </a:pPr>
+            <a:r>
+              <a:rPr b="0" lang="en-US" sz="4400" spc="-1" strike="noStrike">
+                <a:solidFill>
+                  <a:srgbClr val="000000"/>
+                </a:solidFill>
+                <a:latin typeface="Arial"/>
+              </a:rPr>
+              <a:t>Property</a:t>
+            </a:r>
+            <a:endParaRPr b="0" lang="en-US" sz="4400" spc="-1" strike="noStrike">
+              <a:solidFill>
+                <a:srgbClr val="000000"/>
+              </a:solidFill>
               <a:latin typeface="Arial"/>
             </a:endParaRPr>
           </a:p>
@@ -1474,9 +2172,64 @@
           <a:chExt cx="0" cy="0"/>
         </a:xfrm>
       </p:grpSpPr>
+      <p:sp>
+        <p:nvSpPr>
+          <p:cNvPr id="39" name="PlaceHolder 1"/>
+          <p:cNvSpPr>
+            <a:spLocks noGrp="1"/>
+          </p:cNvSpPr>
+          <p:nvPr>
+            <p:ph type="title"/>
+          </p:nvPr>
+        </p:nvSpPr>
+        <p:spPr>
+          <a:xfrm>
+            <a:off x="504000" y="226080"/>
+            <a:ext cx="9071280" cy="946080"/>
+          </a:xfrm>
+          <a:prstGeom prst="rect">
+            <a:avLst/>
+          </a:prstGeom>
+          <a:noFill/>
+          <a:ln w="0">
+            <a:noFill/>
+          </a:ln>
+        </p:spPr>
+        <p:txBody>
+          <a:bodyPr lIns="0" rIns="0" tIns="0" bIns="0" anchor="ctr">
+            <a:noAutofit/>
+          </a:bodyPr>
+          <a:p>
+            <a:pPr indent="0" algn="ctr">
+              <a:lnSpc>
+                <a:spcPct val="100000"/>
+              </a:lnSpc>
+              <a:buNone/>
+              <a:tabLst>
+                <a:tab algn="l" pos="0"/>
+              </a:tabLst>
+            </a:pPr>
+            <a:r>
+              <a:rPr b="0" lang="en-US" sz="4400" spc="-1" strike="noStrike">
+                <a:solidFill>
+                  <a:srgbClr val="000000"/>
+                </a:solidFill>
+                <a:latin typeface="Arial"/>
+              </a:rPr>
+              <a:t>Пишем документацию</a:t>
+            </a:r>
+            <a:endParaRPr b="0" lang="en-US" sz="4400" spc="-1" strike="noStrike">
+              <a:solidFill>
+                <a:srgbClr val="000000"/>
+              </a:solidFill>
+              <a:latin typeface="Arial"/>
+            </a:endParaRPr>
+          </a:p>
+        </p:txBody>
+      </p:sp>
       <p:pic>
         <p:nvPicPr>
-          <p:cNvPr id="37" name="" descr=""/>
+          <p:cNvPr id="40" name="" descr=""/>
           <p:cNvPicPr/>
           <p:nvPr/>
         </p:nvPicPr>
@@ -1486,8 +2239,138 @@
         </p:blipFill>
         <p:spPr>
           <a:xfrm>
+            <a:off x="457200" y="1600200"/>
+            <a:ext cx="4018320" cy="3427560"/>
+          </a:xfrm>
+          <a:prstGeom prst="rect">
+            <a:avLst/>
+          </a:prstGeom>
+          <a:ln w="0">
+            <a:noFill/>
+          </a:ln>
+        </p:spPr>
+      </p:pic>
+      <p:pic>
+        <p:nvPicPr>
+          <p:cNvPr id="41" name="" descr=""/>
+          <p:cNvPicPr/>
+          <p:nvPr/>
+        </p:nvPicPr>
+        <p:blipFill>
+          <a:blip r:embed="rId2"/>
+          <a:srcRect l="0" t="0" r="54632" b="0"/>
+          <a:stretch/>
+        </p:blipFill>
+        <p:spPr>
+          <a:xfrm>
+            <a:off x="5029200" y="2136600"/>
+            <a:ext cx="4571640" cy="2663640"/>
+          </a:xfrm>
+          <a:prstGeom prst="rect">
+            <a:avLst/>
+          </a:prstGeom>
+          <a:ln w="0">
+            <a:noFill/>
+          </a:ln>
+        </p:spPr>
+      </p:pic>
+      <p:sp>
+        <p:nvSpPr>
+          <p:cNvPr id="42" name=""/>
+          <p:cNvSpPr/>
+          <p:nvPr/>
+        </p:nvSpPr>
+        <p:spPr>
+          <a:xfrm>
+            <a:off x="5486400" y="1679400"/>
+            <a:ext cx="4343040" cy="456840"/>
+          </a:xfrm>
+          <a:prstGeom prst="rect">
+            <a:avLst/>
+          </a:prstGeom>
+          <a:noFill/>
+          <a:ln w="0">
+            <a:noFill/>
+          </a:ln>
+        </p:spPr>
+        <p:style>
+          <a:lnRef idx="0"/>
+          <a:fillRef idx="0"/>
+          <a:effectRef idx="0"/>
+          <a:fontRef idx="minor"/>
+        </p:style>
+        <p:txBody>
+          <a:bodyPr lIns="90000" rIns="90000" tIns="45000" bIns="45000" anchor="t">
+            <a:noAutofit/>
+          </a:bodyPr>
+          <a:p>
+            <a:pPr>
+              <a:lnSpc>
+                <a:spcPct val="100000"/>
+              </a:lnSpc>
+            </a:pPr>
+            <a:r>
+              <a:rPr b="0" lang="en-US" sz="1800" spc="-1" strike="noStrike">
+                <a:solidFill>
+                  <a:srgbClr val="000000"/>
+                </a:solidFill>
+                <a:latin typeface="Arial"/>
+              </a:rPr>
+              <a:t>Результат выполнения метода слева</a:t>
+            </a:r>
+            <a:endParaRPr b="0" lang="en-US" sz="1800" spc="-1" strike="noStrike">
+              <a:solidFill>
+                <a:srgbClr val="000000"/>
+              </a:solidFill>
+              <a:latin typeface="Arial"/>
+            </a:endParaRPr>
+          </a:p>
+        </p:txBody>
+      </p:sp>
+    </p:spTree>
+  </p:cSld>
+  <mc:AlternateContent>
+    <mc:Choice Requires="p14">
+      <p:transition spd="slow" p14:dur="2000"/>
+    </mc:Choice>
+    <mc:Fallback>
+      <p:transition spd="slow"/>
+    </mc:Fallback>
+  </mc:AlternateContent>
+</p:sld>
+</file>
+
+<file path=ppt/slides/slide15.xml><?xml version="1.0" encoding="utf-8"?>
+<p:sld xmlns:a="http://schemas.openxmlformats.org/drawingml/2006/main" xmlns:p="http://schemas.openxmlformats.org/presentationml/2006/main" xmlns:r="http://schemas.openxmlformats.org/officeDocument/2006/relationships" xmlns:p14="http://schemas.microsoft.com/office/powerpoint/2010/main" xmlns:p15="http://schemas.microsoft.com/office/powerpoint/2012/main" xmlns:mc="http://schemas.openxmlformats.org/markup-compatibility/2006">
+  <p:cSld>
+    <p:spTree>
+      <p:nvGrpSpPr>
+        <p:cNvPr id="1" name=""/>
+        <p:cNvGrpSpPr/>
+        <p:nvPr/>
+      </p:nvGrpSpPr>
+      <p:grpSpPr>
+        <a:xfrm>
+          <a:off x="0" y="0"/>
+          <a:ext cx="0" cy="0"/>
+          <a:chOff x="0" y="0"/>
+          <a:chExt cx="0" cy="0"/>
+        </a:xfrm>
+      </p:grpSpPr>
+      <p:pic>
+        <p:nvPicPr>
+          <p:cNvPr id="43" name="" descr=""/>
+          <p:cNvPicPr/>
+          <p:nvPr/>
+        </p:nvPicPr>
+        <p:blipFill>
+          <a:blip r:embed="rId1"/>
+          <a:stretch/>
+        </p:blipFill>
+        <p:spPr>
+          <a:xfrm>
             <a:off x="2971800" y="1371600"/>
-            <a:ext cx="4114800" cy="4114800"/>
+            <a:ext cx="4114440" cy="4114440"/>
           </a:xfrm>
           <a:prstGeom prst="rect">
             <a:avLst/>
@@ -1499,7 +2382,7 @@
       </p:pic>
       <p:sp>
         <p:nvSpPr>
-          <p:cNvPr id="38" name="PlaceHolder 1"/>
+          <p:cNvPr id="44" name="PlaceHolder 1"/>
           <p:cNvSpPr>
             <a:spLocks noGrp="1"/>
           </p:cNvSpPr>
@@ -1510,7 +2393,7 @@
         <p:spPr>
           <a:xfrm>
             <a:off x="529560" y="228600"/>
-            <a:ext cx="9071640" cy="946440"/>
+            <a:ext cx="9071280" cy="946080"/>
           </a:xfrm>
           <a:prstGeom prst="rect">
             <a:avLst/>
@@ -1526,23 +2409,27 @@
           </a:bodyPr>
           <a:p>
             <a:pPr indent="0" algn="ctr">
+              <a:lnSpc>
+                <a:spcPct val="100000"/>
+              </a:lnSpc>
               <a:buNone/>
-            </a:pPr>
-            <a:r>
-              <a:rPr b="0" lang="en-US" sz="4400" strike="noStrike" u="none">
-                <a:solidFill>
-                  <a:srgbClr val="000000"/>
-                </a:solidFill>
-                <a:uFillTx/>
+              <a:tabLst>
+                <a:tab algn="l" pos="0"/>
+              </a:tabLst>
+            </a:pPr>
+            <a:r>
+              <a:rPr b="0" lang="en-US" sz="4400" spc="-1" strike="noStrike">
+                <a:solidFill>
+                  <a:srgbClr val="000000"/>
+                </a:solidFill>
                 <a:latin typeface="Arial"/>
               </a:rPr>
               <a:t>Спасибо за внимание!</a:t>
             </a:r>
-            <a:endParaRPr b="0" lang="en-US" sz="4400" strike="noStrike" u="none">
-              <a:solidFill>
-                <a:srgbClr val="000000"/>
-              </a:solidFill>
-              <a:uFillTx/>
+            <a:endParaRPr b="0" lang="en-US" sz="4400" spc="-1" strike="noStrike">
+              <a:solidFill>
+                <a:srgbClr val="000000"/>
+              </a:solidFill>
               <a:latin typeface="Arial"/>
             </a:endParaRPr>
           </a:p>
@@ -1580,7 +2467,7 @@
       </p:grpSpPr>
       <p:sp>
         <p:nvSpPr>
-          <p:cNvPr id="10" name="PlaceHolder 1"/>
+          <p:cNvPr id="15" name="PlaceHolder 1"/>
           <p:cNvSpPr>
             <a:spLocks noGrp="1"/>
           </p:cNvSpPr>
@@ -1591,7 +2478,7 @@
         <p:spPr>
           <a:xfrm>
             <a:off x="504000" y="226080"/>
-            <a:ext cx="9071640" cy="946440"/>
+            <a:ext cx="9071280" cy="946080"/>
           </a:xfrm>
           <a:prstGeom prst="rect">
             <a:avLst/>
@@ -1607,23 +2494,27 @@
           </a:bodyPr>
           <a:p>
             <a:pPr indent="0" algn="ctr">
+              <a:lnSpc>
+                <a:spcPct val="100000"/>
+              </a:lnSpc>
               <a:buNone/>
-            </a:pPr>
-            <a:r>
-              <a:rPr b="0" lang="en-US" sz="4400" strike="noStrike" u="none">
-                <a:solidFill>
-                  <a:srgbClr val="000000"/>
-                </a:solidFill>
-                <a:uFillTx/>
+              <a:tabLst>
+                <a:tab algn="l" pos="0"/>
+              </a:tabLst>
+            </a:pPr>
+            <a:r>
+              <a:rPr b="0" lang="en-US" sz="4400" spc="-1" strike="noStrike">
+                <a:solidFill>
+                  <a:srgbClr val="000000"/>
+                </a:solidFill>
                 <a:latin typeface="Arial"/>
               </a:rPr>
               <a:t>База</a:t>
             </a:r>
-            <a:endParaRPr b="0" lang="en-US" sz="4400" strike="noStrike" u="none">
-              <a:solidFill>
-                <a:srgbClr val="000000"/>
-              </a:solidFill>
-              <a:uFillTx/>
+            <a:endParaRPr b="0" lang="en-US" sz="4400" spc="-1" strike="noStrike">
+              <a:solidFill>
+                <a:srgbClr val="000000"/>
+              </a:solidFill>
               <a:latin typeface="Arial"/>
             </a:endParaRPr>
           </a:p>
@@ -1631,7 +2522,7 @@
       </p:sp>
       <p:pic>
         <p:nvPicPr>
-          <p:cNvPr id="11" name="" descr=""/>
+          <p:cNvPr id="16" name="" descr=""/>
           <p:cNvPicPr/>
           <p:nvPr/>
         </p:nvPicPr>
@@ -1642,7 +2533,7 @@
         <p:spPr>
           <a:xfrm>
             <a:off x="1055520" y="1371600"/>
-            <a:ext cx="8088480" cy="3027960"/>
+            <a:ext cx="8088120" cy="3027600"/>
           </a:xfrm>
           <a:prstGeom prst="rect">
             <a:avLst/>
@@ -1684,7 +2575,7 @@
       </p:grpSpPr>
       <p:sp>
         <p:nvSpPr>
-          <p:cNvPr id="12" name="PlaceHolder 1"/>
+          <p:cNvPr id="17" name="PlaceHolder 1"/>
           <p:cNvSpPr>
             <a:spLocks noGrp="1"/>
           </p:cNvSpPr>
@@ -1695,7 +2586,7 @@
         <p:spPr>
           <a:xfrm>
             <a:off x="504000" y="226080"/>
-            <a:ext cx="9071640" cy="946440"/>
+            <a:ext cx="9071280" cy="946080"/>
           </a:xfrm>
           <a:prstGeom prst="rect">
             <a:avLst/>
@@ -1711,23 +2602,27 @@
           </a:bodyPr>
           <a:p>
             <a:pPr indent="0" algn="ctr">
+              <a:lnSpc>
+                <a:spcPct val="100000"/>
+              </a:lnSpc>
               <a:buNone/>
-            </a:pPr>
-            <a:r>
-              <a:rPr b="0" lang="en-US" sz="4400" strike="noStrike" u="none">
-                <a:solidFill>
-                  <a:srgbClr val="000000"/>
-                </a:solidFill>
-                <a:uFillTx/>
+              <a:tabLst>
+                <a:tab algn="l" pos="0"/>
+              </a:tabLst>
+            </a:pPr>
+            <a:r>
+              <a:rPr b="0" lang="en-US" sz="4400" spc="-1" strike="noStrike">
+                <a:solidFill>
+                  <a:srgbClr val="000000"/>
+                </a:solidFill>
                 <a:latin typeface="Arial"/>
               </a:rPr>
               <a:t>Атрибуты класса</a:t>
             </a:r>
-            <a:endParaRPr b="0" lang="en-US" sz="4400" strike="noStrike" u="none">
-              <a:solidFill>
-                <a:srgbClr val="000000"/>
-              </a:solidFill>
-              <a:uFillTx/>
+            <a:endParaRPr b="0" lang="en-US" sz="4400" spc="-1" strike="noStrike">
+              <a:solidFill>
+                <a:srgbClr val="000000"/>
+              </a:solidFill>
               <a:latin typeface="Arial"/>
             </a:endParaRPr>
           </a:p>
@@ -1735,7 +2630,7 @@
       </p:sp>
       <p:pic>
         <p:nvPicPr>
-          <p:cNvPr id="13" name="" descr=""/>
+          <p:cNvPr id="18" name="" descr=""/>
           <p:cNvPicPr/>
           <p:nvPr/>
         </p:nvPicPr>
@@ -1746,7 +2641,7 @@
         <p:spPr>
           <a:xfrm>
             <a:off x="2057400" y="1371600"/>
-            <a:ext cx="5943600" cy="3601440"/>
+            <a:ext cx="5943240" cy="3601080"/>
           </a:xfrm>
           <a:prstGeom prst="rect">
             <a:avLst/>
@@ -1788,7 +2683,7 @@
       </p:grpSpPr>
       <p:sp>
         <p:nvSpPr>
-          <p:cNvPr id="14" name="PlaceHolder 1"/>
+          <p:cNvPr id="19" name="PlaceHolder 1"/>
           <p:cNvSpPr>
             <a:spLocks noGrp="1"/>
           </p:cNvSpPr>
@@ -1799,7 +2694,7 @@
         <p:spPr>
           <a:xfrm>
             <a:off x="6400800" y="867960"/>
-            <a:ext cx="3308400" cy="1875240"/>
+            <a:ext cx="3308040" cy="1874880"/>
           </a:xfrm>
           <a:prstGeom prst="rect">
             <a:avLst/>
@@ -1815,23 +2710,27 @@
           </a:bodyPr>
           <a:p>
             <a:pPr indent="0" algn="ctr">
+              <a:lnSpc>
+                <a:spcPct val="100000"/>
+              </a:lnSpc>
               <a:buNone/>
-            </a:pPr>
-            <a:r>
-              <a:rPr b="0" lang="en-US" sz="4400" strike="noStrike" u="none">
-                <a:solidFill>
-                  <a:srgbClr val="000000"/>
-                </a:solidFill>
-                <a:uFillTx/>
+              <a:tabLst>
+                <a:tab algn="l" pos="0"/>
+              </a:tabLst>
+            </a:pPr>
+            <a:r>
+              <a:rPr b="0" lang="en-US" sz="4400" spc="-1" strike="noStrike">
+                <a:solidFill>
+                  <a:srgbClr val="000000"/>
+                </a:solidFill>
                 <a:latin typeface="Arial"/>
               </a:rPr>
               <a:t>Ещё атрибуты класса</a:t>
             </a:r>
-            <a:endParaRPr b="0" lang="en-US" sz="4400" strike="noStrike" u="none">
-              <a:solidFill>
-                <a:srgbClr val="000000"/>
-              </a:solidFill>
-              <a:uFillTx/>
+            <a:endParaRPr b="0" lang="en-US" sz="4400" spc="-1" strike="noStrike">
+              <a:solidFill>
+                <a:srgbClr val="000000"/>
+              </a:solidFill>
               <a:latin typeface="Arial"/>
             </a:endParaRPr>
           </a:p>
@@ -1839,7 +2738,7 @@
       </p:sp>
       <p:pic>
         <p:nvPicPr>
-          <p:cNvPr id="15" name="" descr=""/>
+          <p:cNvPr id="20" name="" descr=""/>
           <p:cNvPicPr/>
           <p:nvPr/>
         </p:nvPicPr>
@@ -1851,7 +2750,7 @@
         <p:spPr>
           <a:xfrm>
             <a:off x="228600" y="276480"/>
-            <a:ext cx="6292800" cy="5209920"/>
+            <a:ext cx="6292440" cy="5209560"/>
           </a:xfrm>
           <a:prstGeom prst="rect">
             <a:avLst/>
@@ -1863,14 +2762,14 @@
       </p:pic>
       <p:sp>
         <p:nvSpPr>
-          <p:cNvPr id="16" name=""/>
-          <p:cNvSpPr txBox="1"/>
+          <p:cNvPr id="21" name=""/>
+          <p:cNvSpPr/>
           <p:nvPr/>
         </p:nvSpPr>
         <p:spPr>
           <a:xfrm>
             <a:off x="6858000" y="3200400"/>
-            <a:ext cx="2514600" cy="1626120"/>
+            <a:ext cx="2514240" cy="1625760"/>
           </a:xfrm>
           <a:prstGeom prst="rect">
             <a:avLst/>
@@ -1880,47 +2779,57 @@
             <a:noFill/>
           </a:ln>
         </p:spPr>
+        <p:style>
+          <a:lnRef idx="0"/>
+          <a:fillRef idx="0"/>
+          <a:effectRef idx="0"/>
+          <a:fontRef idx="minor"/>
+        </p:style>
         <p:txBody>
           <a:bodyPr lIns="90000" rIns="90000" tIns="45000" bIns="45000" anchor="t">
             <a:noAutofit/>
           </a:bodyPr>
           <a:p>
-            <a:pPr algn="ctr"/>
-            <a:r>
-              <a:rPr b="1" lang="en-US" sz="1800" strike="noStrike" u="none">
-                <a:solidFill>
-                  <a:srgbClr val="000000"/>
-                </a:solidFill>
-                <a:uFillTx/>
+            <a:pPr algn="ctr">
+              <a:lnSpc>
+                <a:spcPct val="100000"/>
+              </a:lnSpc>
+            </a:pPr>
+            <a:r>
+              <a:rPr b="1" lang="en-US" sz="1800" spc="-1" strike="noStrike">
+                <a:solidFill>
+                  <a:srgbClr val="000000"/>
+                </a:solidFill>
                 <a:latin typeface="Arial"/>
               </a:rPr>
               <a:t>Важно!</a:t>
             </a:r>
-            <a:endParaRPr b="0" lang="en-US" sz="1800" strike="noStrike" u="none">
-              <a:solidFill>
-                <a:srgbClr val="000000"/>
-              </a:solidFill>
-              <a:uFillTx/>
-              <a:latin typeface="Arial"/>
-            </a:endParaRPr>
-          </a:p>
-          <a:p>
-            <a:pPr algn="ctr"/>
-            <a:r>
-              <a:rPr b="0" lang="en-US" sz="1800" strike="noStrike" u="none">
-                <a:solidFill>
-                  <a:srgbClr val="000000"/>
-                </a:solidFill>
-                <a:uFillTx/>
+            <a:endParaRPr b="0" lang="en-US" sz="1800" spc="-1" strike="noStrike">
+              <a:solidFill>
+                <a:srgbClr val="000000"/>
+              </a:solidFill>
+              <a:latin typeface="Arial"/>
+            </a:endParaRPr>
+          </a:p>
+          <a:p>
+            <a:pPr algn="ctr">
+              <a:lnSpc>
+                <a:spcPct val="100000"/>
+              </a:lnSpc>
+            </a:pPr>
+            <a:r>
+              <a:rPr b="0" lang="en-US" sz="1800" spc="-1" strike="noStrike">
+                <a:solidFill>
+                  <a:srgbClr val="000000"/>
+                </a:solidFill>
                 <a:latin typeface="Arial"/>
               </a:rPr>
               <a:t>Если поле класса изменяется через объект, то это поле «приватизируется» объектом</a:t>
             </a:r>
-            <a:endParaRPr b="0" lang="en-US" sz="1800" strike="noStrike" u="none">
-              <a:solidFill>
-                <a:srgbClr val="000000"/>
-              </a:solidFill>
-              <a:uFillTx/>
+            <a:endParaRPr b="0" lang="en-US" sz="1800" spc="-1" strike="noStrike">
+              <a:solidFill>
+                <a:srgbClr val="000000"/>
+              </a:solidFill>
               <a:latin typeface="Arial"/>
             </a:endParaRPr>
           </a:p>
@@ -1958,7 +2867,7 @@
       </p:grpSpPr>
       <p:sp>
         <p:nvSpPr>
-          <p:cNvPr id="17" name="PlaceHolder 1"/>
+          <p:cNvPr id="22" name="PlaceHolder 1"/>
           <p:cNvSpPr>
             <a:spLocks noGrp="1"/>
           </p:cNvSpPr>
@@ -1969,7 +2878,7 @@
         <p:spPr>
           <a:xfrm>
             <a:off x="457200" y="2178720"/>
-            <a:ext cx="3200400" cy="1250280"/>
+            <a:ext cx="3200040" cy="1249920"/>
           </a:xfrm>
           <a:prstGeom prst="rect">
             <a:avLst/>
@@ -1985,14 +2894,19 @@
           </a:bodyPr>
           <a:p>
             <a:pPr indent="0" algn="ctr">
+              <a:lnSpc>
+                <a:spcPct val="100000"/>
+              </a:lnSpc>
               <a:buNone/>
-            </a:pPr>
-            <a:r>
-              <a:rPr b="0" lang="en-US" sz="4400" strike="noStrike" u="none">
-                <a:solidFill>
-                  <a:srgbClr val="000000"/>
-                </a:solidFill>
-                <a:uFillTx/>
+              <a:tabLst>
+                <a:tab algn="l" pos="0"/>
+              </a:tabLst>
+            </a:pPr>
+            <a:r>
+              <a:rPr b="0" lang="en-US" sz="4400" spc="-1" strike="noStrike">
+                <a:solidFill>
+                  <a:srgbClr val="000000"/>
+                </a:solidFill>
                 <a:latin typeface="Arial"/>
               </a:rPr>
               <a:t>Методы </a:t>
@@ -2001,20 +2915,18 @@
               <a:rPr sz="4400"/>
             </a:br>
             <a:r>
-              <a:rPr b="0" lang="en-US" sz="4400" strike="noStrike" u="none">
-                <a:solidFill>
-                  <a:srgbClr val="000000"/>
-                </a:solidFill>
-                <a:uFillTx/>
+              <a:rPr b="0" lang="en-US" sz="4400" spc="-1" strike="noStrike">
+                <a:solidFill>
+                  <a:srgbClr val="000000"/>
+                </a:solidFill>
                 <a:latin typeface="Arial"/>
               </a:rPr>
               <a:t>класса</a:t>
             </a:r>
-            <a:endParaRPr b="0" lang="en-US" sz="4400" strike="noStrike" u="none">
-              <a:solidFill>
-                <a:srgbClr val="000000"/>
-              </a:solidFill>
-              <a:uFillTx/>
+            <a:endParaRPr b="0" lang="en-US" sz="4400" spc="-1" strike="noStrike">
+              <a:solidFill>
+                <a:srgbClr val="000000"/>
+              </a:solidFill>
               <a:latin typeface="Arial"/>
             </a:endParaRPr>
           </a:p>
@@ -2022,7 +2934,7 @@
       </p:sp>
       <p:pic>
         <p:nvPicPr>
-          <p:cNvPr id="18" name="" descr=""/>
+          <p:cNvPr id="23" name="" descr=""/>
           <p:cNvPicPr/>
           <p:nvPr/>
         </p:nvPicPr>
@@ -2033,7 +2945,7 @@
         <p:spPr>
           <a:xfrm>
             <a:off x="4343400" y="457200"/>
-            <a:ext cx="4955760" cy="4800600"/>
+            <a:ext cx="4955400" cy="4800240"/>
           </a:xfrm>
           <a:prstGeom prst="rect">
             <a:avLst/>
@@ -2075,7 +2987,7 @@
       </p:grpSpPr>
       <p:sp>
         <p:nvSpPr>
-          <p:cNvPr id="19" name="PlaceHolder 1"/>
+          <p:cNvPr id="24" name="PlaceHolder 1"/>
           <p:cNvSpPr>
             <a:spLocks noGrp="1"/>
           </p:cNvSpPr>
@@ -2086,7 +2998,7 @@
         <p:spPr>
           <a:xfrm>
             <a:off x="504000" y="226080"/>
-            <a:ext cx="9071640" cy="946440"/>
+            <a:ext cx="9071280" cy="946080"/>
           </a:xfrm>
           <a:prstGeom prst="rect">
             <a:avLst/>
@@ -2102,23 +3014,27 @@
           </a:bodyPr>
           <a:p>
             <a:pPr indent="0" algn="ctr">
+              <a:lnSpc>
+                <a:spcPct val="100000"/>
+              </a:lnSpc>
               <a:buNone/>
-            </a:pPr>
-            <a:r>
-              <a:rPr b="0" lang="en-US" sz="4400" strike="noStrike" u="none">
-                <a:solidFill>
-                  <a:srgbClr val="000000"/>
-                </a:solidFill>
-                <a:uFillTx/>
+              <a:tabLst>
+                <a:tab algn="l" pos="0"/>
+              </a:tabLst>
+            </a:pPr>
+            <a:r>
+              <a:rPr b="0" lang="en-US" sz="4400" spc="-1" strike="noStrike">
+                <a:solidFill>
+                  <a:srgbClr val="000000"/>
+                </a:solidFill>
                 <a:latin typeface="Arial"/>
               </a:rPr>
               <a:t>Инкапсуляция</a:t>
             </a:r>
-            <a:endParaRPr b="0" lang="en-US" sz="4400" strike="noStrike" u="none">
-              <a:solidFill>
-                <a:srgbClr val="000000"/>
-              </a:solidFill>
-              <a:uFillTx/>
+            <a:endParaRPr b="0" lang="en-US" sz="4400" spc="-1" strike="noStrike">
+              <a:solidFill>
+                <a:srgbClr val="000000"/>
+              </a:solidFill>
               <a:latin typeface="Arial"/>
             </a:endParaRPr>
           </a:p>
@@ -2126,7 +3042,7 @@
       </p:sp>
       <p:pic>
         <p:nvPicPr>
-          <p:cNvPr id="20" name="" descr=""/>
+          <p:cNvPr id="25" name="" descr=""/>
           <p:cNvPicPr/>
           <p:nvPr/>
         </p:nvPicPr>
@@ -2137,7 +3053,7 @@
         <p:spPr>
           <a:xfrm>
             <a:off x="1371600" y="1515600"/>
-            <a:ext cx="7494840" cy="3285000"/>
+            <a:ext cx="7494480" cy="3284640"/>
           </a:xfrm>
           <a:prstGeom prst="rect">
             <a:avLst/>
@@ -2179,7 +3095,7 @@
       </p:grpSpPr>
       <p:sp>
         <p:nvSpPr>
-          <p:cNvPr id="21" name="PlaceHolder 1"/>
+          <p:cNvPr id="26" name="PlaceHolder 1"/>
           <p:cNvSpPr>
             <a:spLocks noGrp="1"/>
           </p:cNvSpPr>
@@ -2190,7 +3106,7 @@
         <p:spPr>
           <a:xfrm>
             <a:off x="5486400" y="2286000"/>
-            <a:ext cx="4343400" cy="946440"/>
+            <a:ext cx="4343040" cy="946080"/>
           </a:xfrm>
           <a:prstGeom prst="rect">
             <a:avLst/>
@@ -2206,23 +3122,27 @@
           </a:bodyPr>
           <a:p>
             <a:pPr indent="0" algn="ctr">
+              <a:lnSpc>
+                <a:spcPct val="100000"/>
+              </a:lnSpc>
               <a:buNone/>
-            </a:pPr>
-            <a:r>
-              <a:rPr b="0" lang="en-US" sz="4400" strike="noStrike" u="none">
-                <a:solidFill>
-                  <a:srgbClr val="000000"/>
-                </a:solidFill>
-                <a:uFillTx/>
+              <a:tabLst>
+                <a:tab algn="l" pos="0"/>
+              </a:tabLst>
+            </a:pPr>
+            <a:r>
+              <a:rPr b="0" lang="en-US" sz="4400" spc="-1" strike="noStrike">
+                <a:solidFill>
+                  <a:srgbClr val="000000"/>
+                </a:solidFill>
                 <a:latin typeface="Arial"/>
               </a:rPr>
               <a:t>Наследование</a:t>
             </a:r>
-            <a:endParaRPr b="0" lang="en-US" sz="4400" strike="noStrike" u="none">
-              <a:solidFill>
-                <a:srgbClr val="000000"/>
-              </a:solidFill>
-              <a:uFillTx/>
+            <a:endParaRPr b="0" lang="en-US" sz="4400" spc="-1" strike="noStrike">
+              <a:solidFill>
+                <a:srgbClr val="000000"/>
+              </a:solidFill>
               <a:latin typeface="Arial"/>
             </a:endParaRPr>
           </a:p>
@@ -2230,7 +3150,7 @@
       </p:sp>
       <p:pic>
         <p:nvPicPr>
-          <p:cNvPr id="22" name="" descr=""/>
+          <p:cNvPr id="27" name="" descr=""/>
           <p:cNvPicPr/>
           <p:nvPr/>
         </p:nvPicPr>
@@ -2241,7 +3161,7 @@
         <p:spPr>
           <a:xfrm>
             <a:off x="457200" y="457200"/>
-            <a:ext cx="5029200" cy="4980240"/>
+            <a:ext cx="5028840" cy="4979880"/>
           </a:xfrm>
           <a:prstGeom prst="rect">
             <a:avLst/>
@@ -2283,7 +3203,7 @@
       </p:grpSpPr>
       <p:sp>
         <p:nvSpPr>
-          <p:cNvPr id="23" name="PlaceHolder 1"/>
+          <p:cNvPr id="28" name="PlaceHolder 1"/>
           <p:cNvSpPr>
             <a:spLocks noGrp="1"/>
           </p:cNvSpPr>
@@ -2293,8 +3213,8 @@
         </p:nvSpPr>
         <p:spPr>
           <a:xfrm>
-            <a:off x="504000" y="196560"/>
-            <a:ext cx="9071640" cy="946440"/>
+            <a:off x="504000" y="74160"/>
+            <a:ext cx="9071280" cy="1250280"/>
           </a:xfrm>
           <a:prstGeom prst="rect">
             <a:avLst/>
@@ -2313,48 +3233,23 @@
               <a:buNone/>
             </a:pPr>
             <a:r>
-              <a:rPr b="0" lang="en-US" sz="4400" strike="noStrike" u="none">
-                <a:solidFill>
-                  <a:srgbClr val="000000"/>
-                </a:solidFill>
-                <a:uFillTx/>
-                <a:latin typeface="Arial"/>
-              </a:rPr>
-              <a:t>Полиморфизм</a:t>
-            </a:r>
-            <a:endParaRPr b="0" lang="en-US" sz="4400" strike="noStrike" u="none">
-              <a:solidFill>
-                <a:srgbClr val="000000"/>
-              </a:solidFill>
-              <a:uFillTx/>
-              <a:latin typeface="Arial"/>
-            </a:endParaRPr>
-          </a:p>
-        </p:txBody>
-      </p:sp>
-      <p:pic>
-        <p:nvPicPr>
-          <p:cNvPr id="24" name="" descr=""/>
-          <p:cNvPicPr/>
-          <p:nvPr/>
-        </p:nvPicPr>
-        <p:blipFill>
-          <a:blip r:embed="rId1"/>
-          <a:stretch/>
-        </p:blipFill>
-        <p:spPr>
-          <a:xfrm>
-            <a:off x="2668320" y="1143000"/>
-            <a:ext cx="5104080" cy="3913920"/>
-          </a:xfrm>
-          <a:prstGeom prst="rect">
-            <a:avLst/>
-          </a:prstGeom>
-          <a:ln w="0">
-            <a:noFill/>
-          </a:ln>
-        </p:spPr>
-      </p:pic>
+              <a:rPr b="0" lang="en-US" sz="4400" spc="-1" strike="noStrike">
+                <a:solidFill>
+                  <a:srgbClr val="000000"/>
+                </a:solidFill>
+                <a:latin typeface="Arial"/>
+              </a:rPr>
+              <a:t>Вызов методов родительского класса</a:t>
+            </a:r>
+            <a:endParaRPr b="0" lang="en-US" sz="4400" spc="-1" strike="noStrike">
+              <a:solidFill>
+                <a:srgbClr val="000000"/>
+              </a:solidFill>
+              <a:latin typeface="Arial"/>
+            </a:endParaRPr>
+          </a:p>
+        </p:txBody>
+      </p:sp>
     </p:spTree>
   </p:cSld>
   <mc:AlternateContent>
@@ -2387,7 +3282,7 @@
       </p:grpSpPr>
       <p:sp>
         <p:nvSpPr>
-          <p:cNvPr id="25" name="PlaceHolder 1"/>
+          <p:cNvPr id="29" name="PlaceHolder 1"/>
           <p:cNvSpPr>
             <a:spLocks noGrp="1"/>
           </p:cNvSpPr>
@@ -2397,8 +3292,8 @@
         </p:nvSpPr>
         <p:spPr>
           <a:xfrm>
-            <a:off x="25920" y="349920"/>
-            <a:ext cx="4317840" cy="1250280"/>
+            <a:off x="504000" y="196560"/>
+            <a:ext cx="9071280" cy="946080"/>
           </a:xfrm>
           <a:prstGeom prst="rect">
             <a:avLst/>
@@ -2414,23 +3309,27 @@
           </a:bodyPr>
           <a:p>
             <a:pPr indent="0" algn="ctr">
+              <a:lnSpc>
+                <a:spcPct val="100000"/>
+              </a:lnSpc>
               <a:buNone/>
-            </a:pPr>
-            <a:r>
-              <a:rPr b="0" lang="en-US" sz="4400" strike="noStrike" u="none">
-                <a:solidFill>
-                  <a:srgbClr val="000000"/>
-                </a:solidFill>
-                <a:uFillTx/>
-                <a:latin typeface="Arial"/>
-              </a:rPr>
-              <a:t>Абстрактные методы</a:t>
-            </a:r>
-            <a:endParaRPr b="0" lang="en-US" sz="4400" strike="noStrike" u="none">
-              <a:solidFill>
-                <a:srgbClr val="000000"/>
-              </a:solidFill>
-              <a:uFillTx/>
+              <a:tabLst>
+                <a:tab algn="l" pos="0"/>
+              </a:tabLst>
+            </a:pPr>
+            <a:r>
+              <a:rPr b="0" lang="en-US" sz="4400" spc="-1" strike="noStrike">
+                <a:solidFill>
+                  <a:srgbClr val="000000"/>
+                </a:solidFill>
+                <a:latin typeface="Arial"/>
+              </a:rPr>
+              <a:t>Полиморфизм</a:t>
+            </a:r>
+            <a:endParaRPr b="0" lang="en-US" sz="4400" spc="-1" strike="noStrike">
+              <a:solidFill>
+                <a:srgbClr val="000000"/>
+              </a:solidFill>
               <a:latin typeface="Arial"/>
             </a:endParaRPr>
           </a:p>
@@ -2438,19 +3337,18 @@
       </p:sp>
       <p:pic>
         <p:nvPicPr>
-          <p:cNvPr id="26" name="" descr=""/>
+          <p:cNvPr id="30" name="" descr=""/>
           <p:cNvPicPr/>
           <p:nvPr/>
         </p:nvPicPr>
         <p:blipFill>
           <a:blip r:embed="rId1"/>
-          <a:srcRect l="0" t="0" r="8000" b="0"/>
           <a:stretch/>
         </p:blipFill>
         <p:spPr>
           <a:xfrm>
-            <a:off x="4343760" y="685800"/>
-            <a:ext cx="5257440" cy="4246920"/>
+            <a:off x="2668320" y="1143000"/>
+            <a:ext cx="5103720" cy="3913560"/>
           </a:xfrm>
           <a:prstGeom prst="rect">
             <a:avLst/>
@@ -2460,214 +3358,6 @@
           </a:ln>
         </p:spPr>
       </p:pic>
-      <p:sp>
-        <p:nvSpPr>
-          <p:cNvPr id="27" name=""/>
-          <p:cNvSpPr txBox="1"/>
-          <p:nvPr/>
-        </p:nvSpPr>
-        <p:spPr>
-          <a:xfrm>
-            <a:off x="228600" y="1867320"/>
-            <a:ext cx="3886200" cy="3161880"/>
-          </a:xfrm>
-          <a:prstGeom prst="rect">
-            <a:avLst/>
-          </a:prstGeom>
-          <a:noFill/>
-          <a:ln w="0">
-            <a:noFill/>
-          </a:ln>
-        </p:spPr>
-        <p:txBody>
-          <a:bodyPr lIns="90000" rIns="90000" tIns="45000" bIns="45000" anchor="t">
-            <a:noAutofit/>
-          </a:bodyPr>
-          <a:p>
-            <a:pPr algn="ctr"/>
-            <a:r>
-              <a:rPr b="1" lang="en-US" sz="1800" strike="noStrike" u="none">
-                <a:solidFill>
-                  <a:srgbClr val="000000"/>
-                </a:solidFill>
-                <a:uFillTx/>
-                <a:latin typeface="Arial"/>
-              </a:rPr>
-              <a:t>Важно!</a:t>
-            </a:r>
-            <a:endParaRPr b="0" lang="en-US" sz="1800" strike="noStrike" u="none">
-              <a:solidFill>
-                <a:srgbClr val="000000"/>
-              </a:solidFill>
-              <a:uFillTx/>
-              <a:latin typeface="Arial"/>
-            </a:endParaRPr>
-          </a:p>
-          <a:p>
-            <a:pPr algn="ctr"/>
-            <a:r>
-              <a:rPr b="0" lang="en-US" sz="1800" strike="noStrike" u="none">
-                <a:solidFill>
-                  <a:srgbClr val="000000"/>
-                </a:solidFill>
-                <a:uFillTx/>
-                <a:latin typeface="Arial"/>
-              </a:rPr>
-              <a:t>Абстрактные классы в Python </a:t>
-            </a:r>
-            <a:endParaRPr b="0" lang="en-US" sz="1800" strike="noStrike" u="none">
-              <a:solidFill>
-                <a:srgbClr val="000000"/>
-              </a:solidFill>
-              <a:uFillTx/>
-              <a:latin typeface="Arial"/>
-            </a:endParaRPr>
-          </a:p>
-          <a:p>
-            <a:pPr algn="ctr"/>
-            <a:r>
-              <a:rPr b="0" lang="en-US" sz="1800" strike="noStrike" u="none">
-                <a:solidFill>
-                  <a:srgbClr val="000000"/>
-                </a:solidFill>
-                <a:uFillTx/>
-                <a:latin typeface="Arial"/>
-              </a:rPr>
-              <a:t>реализуются с помощью</a:t>
-            </a:r>
-            <a:endParaRPr b="0" lang="en-US" sz="1800" strike="noStrike" u="none">
-              <a:solidFill>
-                <a:srgbClr val="000000"/>
-              </a:solidFill>
-              <a:uFillTx/>
-              <a:latin typeface="Arial"/>
-            </a:endParaRPr>
-          </a:p>
-          <a:p>
-            <a:pPr algn="ctr"/>
-            <a:r>
-              <a:rPr b="0" lang="en-US" sz="1800" strike="noStrike" u="none">
-                <a:solidFill>
-                  <a:srgbClr val="000000"/>
-                </a:solidFill>
-                <a:uFillTx/>
-                <a:latin typeface="Arial"/>
-              </a:rPr>
-              <a:t>библиотеки </a:t>
-            </a:r>
-            <a:r>
-              <a:rPr b="0" lang="en-US" sz="1800" strike="noStrike" u="none">
-                <a:solidFill>
-                  <a:srgbClr val="158466"/>
-                </a:solidFill>
-                <a:uFillTx/>
-                <a:latin typeface="Arial"/>
-              </a:rPr>
-              <a:t>«abc»</a:t>
-            </a:r>
-            <a:endParaRPr b="0" lang="en-US" sz="1800" strike="noStrike" u="none">
-              <a:solidFill>
-                <a:srgbClr val="000000"/>
-              </a:solidFill>
-              <a:uFillTx/>
-              <a:latin typeface="Arial"/>
-            </a:endParaRPr>
-          </a:p>
-          <a:p>
-            <a:pPr algn="ctr"/>
-            <a:endParaRPr b="0" lang="en-US" sz="1800" strike="noStrike" u="none">
-              <a:solidFill>
-                <a:srgbClr val="000000"/>
-              </a:solidFill>
-              <a:uFillTx/>
-              <a:latin typeface="Arial"/>
-            </a:endParaRPr>
-          </a:p>
-          <a:p>
-            <a:pPr algn="ctr"/>
-            <a:r>
-              <a:rPr b="0" lang="en-US" sz="1800" strike="noStrike" u="none">
-                <a:solidFill>
-                  <a:srgbClr val="000000"/>
-                </a:solidFill>
-                <a:uFillTx/>
-                <a:latin typeface="Arial"/>
-              </a:rPr>
-              <a:t>ABC — Abstract Base Classes</a:t>
-            </a:r>
-            <a:endParaRPr b="0" lang="en-US" sz="1800" strike="noStrike" u="none">
-              <a:solidFill>
-                <a:srgbClr val="000000"/>
-              </a:solidFill>
-              <a:uFillTx/>
-              <a:latin typeface="Arial"/>
-            </a:endParaRPr>
-          </a:p>
-          <a:p>
-            <a:pPr algn="ctr"/>
-            <a:r>
-              <a:rPr b="0" lang="en-US" sz="1800" strike="noStrike" u="none">
-                <a:solidFill>
-                  <a:srgbClr val="000000"/>
-                </a:solidFill>
-                <a:uFillTx/>
-                <a:latin typeface="Arial"/>
-              </a:rPr>
-              <a:t>Импортируемый abstractmethod — декоратор абстрактного метода</a:t>
-            </a:r>
-            <a:endParaRPr b="0" lang="en-US" sz="1800" strike="noStrike" u="none">
-              <a:solidFill>
-                <a:srgbClr val="000000"/>
-              </a:solidFill>
-              <a:uFillTx/>
-              <a:latin typeface="Arial"/>
-            </a:endParaRPr>
-          </a:p>
-          <a:p>
-            <a:pPr algn="ctr"/>
-            <a:endParaRPr b="0" lang="en-US" sz="1800" strike="noStrike" u="none">
-              <a:solidFill>
-                <a:srgbClr val="000000"/>
-              </a:solidFill>
-              <a:uFillTx/>
-              <a:latin typeface="Arial"/>
-            </a:endParaRPr>
-          </a:p>
-          <a:p>
-            <a:pPr algn="ctr"/>
-            <a:r>
-              <a:rPr b="0" lang="en-US" sz="1800" strike="noStrike" u="none">
-                <a:solidFill>
-                  <a:srgbClr val="000000"/>
-                </a:solidFill>
-                <a:uFillTx/>
-                <a:latin typeface="Arial"/>
-              </a:rPr>
-              <a:t>А интерфейсов в Python нет :(</a:t>
-            </a:r>
-            <a:br>
-              <a:rPr sz="1800"/>
-            </a:br>
-            <a:r>
-              <a:rPr b="0" lang="en-US" sz="1800" strike="noStrike" u="none">
-                <a:solidFill>
-                  <a:srgbClr val="000000"/>
-                </a:solidFill>
-                <a:uFillTx/>
-                <a:latin typeface="Arial"/>
-              </a:rPr>
-              <a:t>(по крайней мере, в базовой библиотеке)</a:t>
-            </a:r>
-            <a:endParaRPr b="0" lang="en-US" sz="1800" strike="noStrike" u="none">
-              <a:solidFill>
-                <a:srgbClr val="000000"/>
-              </a:solidFill>
-              <a:uFillTx/>
-              <a:latin typeface="Arial"/>
-            </a:endParaRPr>
-          </a:p>
-        </p:txBody>
-      </p:sp>
     </p:spTree>
   </p:cSld>
   <mc:AlternateContent>
@@ -2785,4 +3475,110 @@
     </a:fmtScheme>
   </a:themeElements>
 </a:theme>
+</file>
+
+<file path=ppt/theme/theme2.xml><?xml version="1.0" encoding="utf-8"?>
+<a:theme xmlns:a="http://schemas.openxmlformats.org/drawingml/2006/main" xmlns:r="http://schemas.openxmlformats.org/officeDocument/2006/relationships" name="Office">
+  <a:themeElements>
+    <a:clrScheme name="LibreOffice">
+      <a:dk1>
+        <a:srgbClr val="000000"/>
+      </a:dk1>
+      <a:lt1>
+        <a:srgbClr val="ffffff"/>
+      </a:lt1>
+      <a:dk2>
+        <a:srgbClr val="000000"/>
+      </a:dk2>
+      <a:lt2>
+        <a:srgbClr val="ffffff"/>
+      </a:lt2>
+      <a:accent1>
+        <a:srgbClr val="18a303"/>
+      </a:accent1>
+      <a:accent2>
+        <a:srgbClr val="0369a3"/>
+      </a:accent2>
+      <a:accent3>
+        <a:srgbClr val="a33e03"/>
+      </a:accent3>
+      <a:accent4>
+        <a:srgbClr val="8e03a3"/>
+      </a:accent4>
+      <a:accent5>
+        <a:srgbClr val="c99c00"/>
+      </a:accent5>
+      <a:accent6>
+        <a:srgbClr val="c9211e"/>
+      </a:accent6>
+      <a:hlink>
+        <a:srgbClr val="0000ee"/>
+      </a:hlink>
+      <a:folHlink>
+        <a:srgbClr val="551a8b"/>
+      </a:folHlink>
+    </a:clrScheme>
+    <a:fontScheme name="Office">
+      <a:majorFont>
+        <a:latin typeface="Arial" pitchFamily="0" charset="1"/>
+        <a:ea typeface="DejaVu Sans" pitchFamily="0" charset="1"/>
+        <a:cs typeface="DejaVu Sans" pitchFamily="0" charset="1"/>
+      </a:majorFont>
+      <a:minorFont>
+        <a:latin typeface="Arial" pitchFamily="0" charset="1"/>
+        <a:ea typeface="DejaVu Sans" pitchFamily="0" charset="1"/>
+        <a:cs typeface="DejaVu Sans" pitchFamily="0" charset="1"/>
+      </a:minorFont>
+    </a:fontScheme>
+    <a:fmtScheme>
+      <a:fillStyleLst>
+        <a:solidFill>
+          <a:schemeClr val="phClr"/>
+        </a:solidFill>
+        <a:solidFill>
+          <a:schemeClr val="phClr"/>
+        </a:solidFill>
+        <a:solidFill>
+          <a:schemeClr val="phClr"/>
+        </a:solidFill>
+      </a:fillStyleLst>
+      <a:lnStyleLst>
+        <a:ln w="6350" cap="flat" cmpd="sng" algn="ctr">
+          <a:prstDash val="solid"/>
+          <a:miter/>
+        </a:ln>
+        <a:ln w="6350" cap="flat" cmpd="sng" algn="ctr">
+          <a:prstDash val="solid"/>
+          <a:miter/>
+        </a:ln>
+        <a:ln w="6350" cap="flat" cmpd="sng" algn="ctr">
+          <a:prstDash val="solid"/>
+          <a:miter/>
+        </a:ln>
+      </a:lnStyleLst>
+      <a:effectStyleLst>
+        <a:effectStyle>
+          <a:effectLst/>
+        </a:effectStyle>
+        <a:effectStyle>
+          <a:effectLst/>
+        </a:effectStyle>
+        <a:effectStyle>
+          <a:effectLst/>
+        </a:effectStyle>
+      </a:effectStyleLst>
+      <a:bgFillStyleLst>
+        <a:solidFill>
+          <a:schemeClr val="phClr"/>
+        </a:solidFill>
+        <a:solidFill>
+          <a:schemeClr val="phClr"/>
+        </a:solidFill>
+        <a:solidFill>
+          <a:schemeClr val="phClr"/>
+        </a:solidFill>
+      </a:bgFillStyleLst>
+    </a:fmtScheme>
+  </a:themeElements>
+</a:theme>
 </file>
</xml_diff>